<commit_message>
Add more bugs to presentaion PowerPoint
</commit_message>
<xml_diff>
--- a/documentation/EECS448_Project4_Group8.pptx
+++ b/documentation/EECS448_Project4_Group8.pptx
@@ -1,6 +1,6 @@
 
 <file path=ppt/presentation.xml><?xml version="1.0" encoding="utf-8"?>
-<p:presentation xmlns:a="http://schemas.openxmlformats.org/drawingml/2006/main" xmlns:r="http://schemas.openxmlformats.org/officeDocument/2006/relationships" xmlns:p="http://schemas.openxmlformats.org/presentationml/2006/main" autoCompressPictures="0">
+<p:presentation xmlns:a="http://schemas.openxmlformats.org/drawingml/2006/main" xmlns:r="http://schemas.openxmlformats.org/officeDocument/2006/relationships" xmlns:p="http://schemas.openxmlformats.org/presentationml/2006/main" saveSubsetFonts="1" autoCompressPictures="0">
   <p:sldMasterIdLst>
     <p:sldMasterId id="2147483840" r:id="rId1"/>
   </p:sldMasterIdLst>
@@ -10,10 +10,13 @@
     <p:sldId id="266" r:id="rId4"/>
     <p:sldId id="260" r:id="rId5"/>
     <p:sldId id="264" r:id="rId6"/>
-    <p:sldId id="268" r:id="rId7"/>
-    <p:sldId id="269" r:id="rId8"/>
-    <p:sldId id="271" r:id="rId9"/>
-    <p:sldId id="270" r:id="rId10"/>
+    <p:sldId id="272" r:id="rId7"/>
+    <p:sldId id="273" r:id="rId8"/>
+    <p:sldId id="274" r:id="rId9"/>
+    <p:sldId id="268" r:id="rId10"/>
+    <p:sldId id="269" r:id="rId11"/>
+    <p:sldId id="271" r:id="rId12"/>
+    <p:sldId id="270" r:id="rId13"/>
   </p:sldIdLst>
   <p:sldSz cx="12192000" cy="6858000"/>
   <p:notesSz cx="6858000" cy="9144000"/>
@@ -126,6 +129,9 @@
             <p14:sldId id="266"/>
             <p14:sldId id="260"/>
             <p14:sldId id="264"/>
+            <p14:sldId id="272"/>
+            <p14:sldId id="273"/>
+            <p14:sldId id="274"/>
             <p14:sldId id="268"/>
             <p14:sldId id="269"/>
             <p14:sldId id="271"/>
@@ -171,7 +177,6 @@
           </a:p>
         </c:rich>
       </c:tx>
-      <c:layout/>
       <c:overlay val="0"/>
     </c:title>
     <c:autoTitleDeleted val="0"/>
@@ -209,9 +214,7 @@
             <c:showBubbleSize val="0"/>
             <c:showLeaderLines val="1"/>
             <c:extLst xmlns:c16r2="http://schemas.microsoft.com/office/drawing/2015/06/chart">
-              <c:ext xmlns:c15="http://schemas.microsoft.com/office/drawing/2012/chart" uri="{CE6537A1-D6FC-4f65-9D91-7224C49458BB}">
-                <c15:layout/>
-              </c:ext>
+              <c:ext xmlns:c15="http://schemas.microsoft.com/office/drawing/2012/chart" uri="{CE6537A1-D6FC-4f65-9D91-7224C49458BB}"/>
             </c:extLst>
           </c:dLbls>
           <c:cat>
@@ -244,7 +247,7 @@
                 <c:formatCode>0.00</c:formatCode>
                 <c:ptCount val="5"/>
                 <c:pt idx="0">
-                  <c:v>27.724799999999995</c:v>
+                  <c:v>27.72479999999999</c:v>
                 </c:pt>
                 <c:pt idx="1">
                   <c:v>1.36</c:v>
@@ -256,7 +259,7 @@
                   <c:v>7.6</c:v>
                 </c:pt>
                 <c:pt idx="4">
-                  <c:v>15</c:v>
+                  <c:v>15.0</c:v>
                 </c:pt>
               </c:numCache>
             </c:numRef>
@@ -281,7 +284,6 @@
     </c:plotArea>
     <c:legend>
       <c:legendPos val="r"/>
-      <c:layout/>
       <c:overlay val="0"/>
     </c:legend>
     <c:plotVisOnly val="1"/>
@@ -1927,12 +1929,12 @@
         <a:fontRef idx="minor"/>
       </dsp:style>
       <dsp:txBody>
-        <a:bodyPr spcFirstLastPara="0" vert="horz" wrap="square" lIns="227584" tIns="20320" rIns="20320" bIns="20320" numCol="1" spcCol="1270" anchor="ctr" anchorCtr="0">
+        <a:bodyPr spcFirstLastPara="0" vert="horz" wrap="square" lIns="234696" tIns="20955" rIns="20955" bIns="20955" numCol="1" spcCol="1270" anchor="ctr" anchorCtr="0">
           <a:noAutofit/>
         </a:bodyPr>
         <a:lstStyle/>
         <a:p>
-          <a:pPr marL="285750" lvl="1" indent="-285750" algn="l" defTabSz="1422400">
+          <a:pPr marL="285750" lvl="1" indent="-285750" algn="l" defTabSz="1466850">
             <a:lnSpc>
               <a:spcPct val="90000"/>
             </a:lnSpc>
@@ -1945,7 +1947,7 @@
             <a:buChar char="••"/>
           </a:pPr>
           <a:r>
-            <a:rPr lang="en-US" sz="3200" kern="1200"/>
+            <a:rPr lang="en-US" sz="3300" kern="1200"/>
             <a:t>Finish and publish product</a:t>
           </a:r>
         </a:p>
@@ -2079,12 +2081,12 @@
         <a:fontRef idx="minor"/>
       </dsp:style>
       <dsp:txBody>
-        <a:bodyPr spcFirstLastPara="0" vert="horz" wrap="square" lIns="227584" tIns="20320" rIns="20320" bIns="20320" numCol="1" spcCol="1270" anchor="ctr" anchorCtr="0">
+        <a:bodyPr spcFirstLastPara="0" vert="horz" wrap="square" lIns="234696" tIns="20955" rIns="20955" bIns="20955" numCol="1" spcCol="1270" anchor="ctr" anchorCtr="0">
           <a:noAutofit/>
         </a:bodyPr>
         <a:lstStyle/>
         <a:p>
-          <a:pPr marL="285750" lvl="1" indent="-285750" algn="l" defTabSz="1422400">
+          <a:pPr marL="285750" lvl="1" indent="-285750" algn="l" defTabSz="1466850">
             <a:lnSpc>
               <a:spcPct val="90000"/>
             </a:lnSpc>
@@ -2097,7 +2099,7 @@
             <a:buChar char="••"/>
           </a:pPr>
           <a:r>
-            <a:rPr lang="en-US" sz="3200" kern="1200"/>
+            <a:rPr lang="en-US" sz="3300" kern="1200"/>
             <a:t>Advertise on Wescoe Beach</a:t>
           </a:r>
         </a:p>
@@ -2231,12 +2233,12 @@
         <a:fontRef idx="minor"/>
       </dsp:style>
       <dsp:txBody>
-        <a:bodyPr spcFirstLastPara="0" vert="horz" wrap="square" lIns="227584" tIns="20320" rIns="20320" bIns="20320" numCol="1" spcCol="1270" anchor="ctr" anchorCtr="0">
+        <a:bodyPr spcFirstLastPara="0" vert="horz" wrap="square" lIns="234696" tIns="20955" rIns="20955" bIns="20955" numCol="1" spcCol="1270" anchor="ctr" anchorCtr="0">
           <a:noAutofit/>
         </a:bodyPr>
         <a:lstStyle/>
         <a:p>
-          <a:pPr marL="285750" lvl="1" indent="-285750" algn="l" defTabSz="1422400">
+          <a:pPr marL="285750" lvl="1" indent="-285750" algn="l" defTabSz="1466850">
             <a:lnSpc>
               <a:spcPct val="90000"/>
             </a:lnSpc>
@@ -2249,7 +2251,7 @@
             <a:buChar char="••"/>
           </a:pPr>
           <a:r>
-            <a:rPr lang="en-US" sz="3200" kern="1200"/>
+            <a:rPr lang="en-US" sz="3300" kern="1200"/>
             <a:t>Finalize Internet Banner and App</a:t>
           </a:r>
         </a:p>
@@ -2383,12 +2385,12 @@
         <a:fontRef idx="minor"/>
       </dsp:style>
       <dsp:txBody>
-        <a:bodyPr spcFirstLastPara="0" vert="horz" wrap="square" lIns="227584" tIns="20320" rIns="20320" bIns="20320" numCol="1" spcCol="1270" anchor="ctr" anchorCtr="0">
+        <a:bodyPr spcFirstLastPara="0" vert="horz" wrap="square" lIns="234696" tIns="20955" rIns="20955" bIns="20955" numCol="1" spcCol="1270" anchor="ctr" anchorCtr="0">
           <a:noAutofit/>
         </a:bodyPr>
         <a:lstStyle/>
         <a:p>
-          <a:pPr marL="285750" lvl="1" indent="-285750" algn="l" defTabSz="1422400">
+          <a:pPr marL="285750" lvl="1" indent="-285750" algn="l" defTabSz="1466850">
             <a:lnSpc>
               <a:spcPct val="90000"/>
             </a:lnSpc>
@@ -2401,7 +2403,7 @@
             <a:buChar char="••"/>
           </a:pPr>
           <a:r>
-            <a:rPr lang="en-US" sz="3200" kern="1200"/>
+            <a:rPr lang="en-US" sz="3300" kern="1200"/>
             <a:t>Start Advertise on Other Websites</a:t>
           </a:r>
         </a:p>
@@ -2535,12 +2537,12 @@
         <a:fontRef idx="minor"/>
       </dsp:style>
       <dsp:txBody>
-        <a:bodyPr spcFirstLastPara="0" vert="horz" wrap="square" lIns="227584" tIns="20320" rIns="20320" bIns="20320" numCol="1" spcCol="1270" anchor="ctr" anchorCtr="0">
+        <a:bodyPr spcFirstLastPara="0" vert="horz" wrap="square" lIns="234696" tIns="20955" rIns="20955" bIns="20955" numCol="1" spcCol="1270" anchor="ctr" anchorCtr="0">
           <a:noAutofit/>
         </a:bodyPr>
         <a:lstStyle/>
         <a:p>
-          <a:pPr marL="285750" lvl="1" indent="-285750" algn="l" defTabSz="1422400">
+          <a:pPr marL="285750" lvl="1" indent="-285750" algn="l" defTabSz="1466850">
             <a:lnSpc>
               <a:spcPct val="90000"/>
             </a:lnSpc>
@@ -2553,7 +2555,7 @@
             <a:buChar char="••"/>
           </a:pPr>
           <a:r>
-            <a:rPr lang="en-US" sz="3200" kern="1200"/>
+            <a:rPr lang="en-US" sz="3300" kern="1200"/>
             <a:t>Launch App on Amazon App Store</a:t>
           </a:r>
         </a:p>
@@ -4242,7 +4244,7 @@
             <a:fld id="{5586B75A-687E-405C-8A0B-8D00578BA2C3}" type="datetimeFigureOut">
               <a:rPr lang="en-US" dirty="0"/>
               <a:pPr/>
-              <a:t>5/10/2016</a:t>
+              <a:t>5/10/16</a:t>
             </a:fld>
             <a:endParaRPr lang="en-US" dirty="0"/>
           </a:p>
@@ -4409,7 +4411,7 @@
             <a:fld id="{5586B75A-687E-405C-8A0B-8D00578BA2C3}" type="datetimeFigureOut">
               <a:rPr lang="en-US" dirty="0"/>
               <a:pPr/>
-              <a:t>5/10/2016</a:t>
+              <a:t>5/10/16</a:t>
             </a:fld>
             <a:endParaRPr lang="en-US" dirty="0"/>
           </a:p>
@@ -4586,7 +4588,7 @@
             <a:fld id="{5586B75A-687E-405C-8A0B-8D00578BA2C3}" type="datetimeFigureOut">
               <a:rPr lang="en-US" dirty="0"/>
               <a:pPr/>
-              <a:t>5/10/2016</a:t>
+              <a:t>5/10/16</a:t>
             </a:fld>
             <a:endParaRPr lang="en-US" dirty="0"/>
           </a:p>
@@ -4753,7 +4755,7 @@
             <a:fld id="{5586B75A-687E-405C-8A0B-8D00578BA2C3}" type="datetimeFigureOut">
               <a:rPr lang="en-US" dirty="0"/>
               <a:pPr/>
-              <a:t>5/10/2016</a:t>
+              <a:t>5/10/16</a:t>
             </a:fld>
             <a:endParaRPr lang="en-US" dirty="0"/>
           </a:p>
@@ -5008,7 +5010,7 @@
             <a:fld id="{5586B75A-687E-405C-8A0B-8D00578BA2C3}" type="datetimeFigureOut">
               <a:rPr lang="en-US" dirty="0"/>
               <a:pPr/>
-              <a:t>5/10/2016</a:t>
+              <a:t>5/10/16</a:t>
             </a:fld>
             <a:endParaRPr lang="en-US" dirty="0"/>
           </a:p>
@@ -5293,7 +5295,7 @@
             <a:fld id="{5586B75A-687E-405C-8A0B-8D00578BA2C3}" type="datetimeFigureOut">
               <a:rPr lang="en-US" dirty="0"/>
               <a:pPr/>
-              <a:t>5/10/2016</a:t>
+              <a:t>5/10/16</a:t>
             </a:fld>
             <a:endParaRPr lang="en-US" dirty="0"/>
           </a:p>
@@ -5732,7 +5734,7 @@
             <a:fld id="{5586B75A-687E-405C-8A0B-8D00578BA2C3}" type="datetimeFigureOut">
               <a:rPr lang="en-US" dirty="0"/>
               <a:pPr/>
-              <a:t>5/10/2016</a:t>
+              <a:t>5/10/16</a:t>
             </a:fld>
             <a:endParaRPr lang="en-US" dirty="0"/>
           </a:p>
@@ -5847,7 +5849,7 @@
             <a:fld id="{5586B75A-687E-405C-8A0B-8D00578BA2C3}" type="datetimeFigureOut">
               <a:rPr lang="en-US" dirty="0"/>
               <a:pPr/>
-              <a:t>5/10/2016</a:t>
+              <a:t>5/10/16</a:t>
             </a:fld>
             <a:endParaRPr lang="en-US" dirty="0"/>
           </a:p>
@@ -5939,7 +5941,7 @@
             <a:fld id="{5586B75A-687E-405C-8A0B-8D00578BA2C3}" type="datetimeFigureOut">
               <a:rPr lang="en-US" dirty="0"/>
               <a:pPr/>
-              <a:t>5/10/2016</a:t>
+              <a:t>5/10/16</a:t>
             </a:fld>
             <a:endParaRPr lang="en-US" dirty="0"/>
           </a:p>
@@ -6224,7 +6226,7 @@
             <a:fld id="{5586B75A-687E-405C-8A0B-8D00578BA2C3}" type="datetimeFigureOut">
               <a:rPr lang="en-US" dirty="0"/>
               <a:pPr/>
-              <a:t>5/10/2016</a:t>
+              <a:t>5/10/16</a:t>
             </a:fld>
             <a:endParaRPr lang="en-US" dirty="0"/>
           </a:p>
@@ -6494,7 +6496,7 @@
             <a:fld id="{5586B75A-687E-405C-8A0B-8D00578BA2C3}" type="datetimeFigureOut">
               <a:rPr lang="en-US" dirty="0"/>
               <a:pPr/>
-              <a:t>5/10/2016</a:t>
+              <a:t>5/10/16</a:t>
             </a:fld>
             <a:endParaRPr lang="en-US" dirty="0"/>
           </a:p>
@@ -6788,7 +6790,7 @@
             <a:fld id="{5586B75A-687E-405C-8A0B-8D00578BA2C3}" type="datetimeFigureOut">
               <a:rPr lang="en-US" dirty="0"/>
               <a:pPr/>
-              <a:t>5/10/2016</a:t>
+              <a:t>5/10/16</a:t>
             </a:fld>
             <a:endParaRPr lang="en-US" dirty="0"/>
           </a:p>
@@ -7319,7 +7321,6 @@
               <a:rPr lang="en-US" dirty="0" smtClean="0"/>
               <a:t>Dilesh Fernando, Paul Charles, Purna Doddapaneni, </a:t>
             </a:r>
-            <a:endParaRPr lang="en-US" dirty="0" smtClean="0"/>
           </a:p>
           <a:p>
             <a:r>
@@ -7332,11 +7333,7 @@
             </a:r>
             <a:r>
               <a:rPr lang="en-US" dirty="0" smtClean="0"/>
-              <a:t> </a:t>
-            </a:r>
-            <a:r>
-              <a:rPr lang="en-US" dirty="0" smtClean="0"/>
-              <a:t>Lee, Kuei Hsien Chu</a:t>
+              <a:t> Lee, Kuei Hsien Chu</a:t>
             </a:r>
             <a:endParaRPr lang="en-US" dirty="0"/>
           </a:p>
@@ -7392,1562 +7389,7 @@
 </p:sld>
 </file>
 
-<file path=ppt/slides/slide2.xml><?xml version="1.0" encoding="utf-8"?>
-<p:sld xmlns:a="http://schemas.openxmlformats.org/drawingml/2006/main" xmlns:r="http://schemas.openxmlformats.org/officeDocument/2006/relationships" xmlns:p="http://schemas.openxmlformats.org/presentationml/2006/main">
-  <p:cSld>
-    <p:spTree>
-      <p:nvGrpSpPr>
-        <p:cNvPr id="1" name=""/>
-        <p:cNvGrpSpPr/>
-        <p:nvPr/>
-      </p:nvGrpSpPr>
-      <p:grpSpPr>
-        <a:xfrm>
-          <a:off x="0" y="0"/>
-          <a:ext cx="0" cy="0"/>
-          <a:chOff x="0" y="0"/>
-          <a:chExt cx="0" cy="0"/>
-        </a:xfrm>
-      </p:grpSpPr>
-      <p:sp>
-        <p:nvSpPr>
-          <p:cNvPr id="10" name="TextBox 9"/>
-          <p:cNvSpPr txBox="1"/>
-          <p:nvPr/>
-        </p:nvSpPr>
-        <p:spPr>
-          <a:xfrm>
-            <a:off x="3640348" y="724619"/>
-            <a:ext cx="5589917" cy="523220"/>
-          </a:xfrm>
-          <a:prstGeom prst="rect">
-            <a:avLst/>
-          </a:prstGeom>
-          <a:noFill/>
-        </p:spPr>
-        <p:txBody>
-          <a:bodyPr wrap="square" rtlCol="0">
-            <a:spAutoFit/>
-          </a:bodyPr>
-          <a:lstStyle/>
-          <a:p>
-            <a:r>
-              <a:rPr lang="en-US" sz="2800" b="1" dirty="0" smtClean="0"/>
-              <a:t>Product Demo</a:t>
-            </a:r>
-            <a:endParaRPr lang="en-US" sz="2800" b="1" dirty="0"/>
-          </a:p>
-        </p:txBody>
-      </p:sp>
-      <p:sp>
-        <p:nvSpPr>
-          <p:cNvPr id="11" name="TextBox 10"/>
-          <p:cNvSpPr txBox="1"/>
-          <p:nvPr/>
-        </p:nvSpPr>
-        <p:spPr>
-          <a:xfrm>
-            <a:off x="3640348" y="1247839"/>
-            <a:ext cx="5589917" cy="6124754"/>
-          </a:xfrm>
-          <a:prstGeom prst="rect">
-            <a:avLst/>
-          </a:prstGeom>
-          <a:noFill/>
-        </p:spPr>
-        <p:txBody>
-          <a:bodyPr wrap="square" rtlCol="0">
-            <a:spAutoFit/>
-          </a:bodyPr>
-          <a:lstStyle/>
-          <a:p>
-            <a:pPr marL="457200" indent="-457200">
-              <a:buClr>
-                <a:srgbClr val="0070C0"/>
-              </a:buClr>
-              <a:buFont typeface="Wingdings" panose="05000000000000000000" pitchFamily="2" charset="2"/>
-              <a:buChar char="Ø"/>
-            </a:pPr>
-            <a:r>
-              <a:rPr lang="en-US" sz="2800" dirty="0"/>
-              <a:t>Users</a:t>
-            </a:r>
-          </a:p>
-          <a:p>
-            <a:pPr marL="914400" lvl="1" indent="-457200">
-              <a:buClr>
-                <a:srgbClr val="0070C0"/>
-              </a:buClr>
-              <a:buFont typeface="Wingdings" panose="05000000000000000000" pitchFamily="2" charset="2"/>
-              <a:buChar char="Ø"/>
-            </a:pPr>
-            <a:r>
-              <a:rPr lang="en-US" sz="2800" dirty="0"/>
-              <a:t>Login/Create User</a:t>
-            </a:r>
-          </a:p>
-          <a:p>
-            <a:pPr marL="914400" lvl="1" indent="-457200">
-              <a:buClr>
-                <a:srgbClr val="0070C0"/>
-              </a:buClr>
-              <a:buFont typeface="Wingdings" panose="05000000000000000000" pitchFamily="2" charset="2"/>
-              <a:buChar char="Ø"/>
-            </a:pPr>
-            <a:r>
-              <a:rPr lang="en-US" sz="2800" dirty="0"/>
-              <a:t>Display Interface/User Info</a:t>
-            </a:r>
-          </a:p>
-          <a:p>
-            <a:pPr marL="914400" lvl="1" indent="-457200">
-              <a:buClr>
-                <a:srgbClr val="0070C0"/>
-              </a:buClr>
-              <a:buFont typeface="Wingdings" panose="05000000000000000000" pitchFamily="2" charset="2"/>
-              <a:buChar char="Ø"/>
-            </a:pPr>
-            <a:r>
-              <a:rPr lang="en-US" sz="2800" dirty="0"/>
-              <a:t>About/Contact</a:t>
-            </a:r>
-          </a:p>
-          <a:p>
-            <a:pPr marL="457200" indent="-457200">
-              <a:buClr>
-                <a:srgbClr val="0070C0"/>
-              </a:buClr>
-              <a:buFont typeface="Wingdings" panose="05000000000000000000" pitchFamily="2" charset="2"/>
-              <a:buChar char="Ø"/>
-            </a:pPr>
-            <a:r>
-              <a:rPr lang="en-US" sz="2800" dirty="0"/>
-              <a:t>Groups</a:t>
-            </a:r>
-          </a:p>
-          <a:p>
-            <a:pPr marL="914400" lvl="1" indent="-457200">
-              <a:buClr>
-                <a:srgbClr val="0070C0"/>
-              </a:buClr>
-              <a:buFont typeface="Wingdings" panose="05000000000000000000" pitchFamily="2" charset="2"/>
-              <a:buChar char="Ø"/>
-            </a:pPr>
-            <a:r>
-              <a:rPr lang="en-US" sz="2800" dirty="0"/>
-              <a:t>Add Group</a:t>
-            </a:r>
-          </a:p>
-          <a:p>
-            <a:pPr marL="914400" lvl="1" indent="-457200">
-              <a:buClr>
-                <a:srgbClr val="0070C0"/>
-              </a:buClr>
-              <a:buFont typeface="Wingdings" panose="05000000000000000000" pitchFamily="2" charset="2"/>
-              <a:buChar char="Ø"/>
-            </a:pPr>
-            <a:r>
-              <a:rPr lang="en-US" sz="2800" dirty="0"/>
-              <a:t>View Group</a:t>
-            </a:r>
-          </a:p>
-          <a:p>
-            <a:pPr marL="914400" lvl="1" indent="-457200">
-              <a:buClr>
-                <a:srgbClr val="0070C0"/>
-              </a:buClr>
-              <a:buFont typeface="Wingdings" panose="05000000000000000000" pitchFamily="2" charset="2"/>
-              <a:buChar char="Ø"/>
-            </a:pPr>
-            <a:r>
-              <a:rPr lang="en-US" sz="2800" dirty="0"/>
-              <a:t>Add Members</a:t>
-            </a:r>
-          </a:p>
-          <a:p>
-            <a:pPr marL="914400" lvl="1" indent="-457200">
-              <a:buClr>
-                <a:srgbClr val="0070C0"/>
-              </a:buClr>
-              <a:buFont typeface="Wingdings" panose="05000000000000000000" pitchFamily="2" charset="2"/>
-              <a:buChar char="Ø"/>
-            </a:pPr>
-            <a:r>
-              <a:rPr lang="en-US" sz="2800" dirty="0"/>
-              <a:t>Join Group</a:t>
-            </a:r>
-          </a:p>
-          <a:p>
-            <a:pPr marL="457200" indent="-457200">
-              <a:buClr>
-                <a:srgbClr val="0070C0"/>
-              </a:buClr>
-              <a:buFont typeface="Wingdings" panose="05000000000000000000" pitchFamily="2" charset="2"/>
-              <a:buChar char="Ø"/>
-            </a:pPr>
-            <a:r>
-              <a:rPr lang="en-US" sz="2800" dirty="0"/>
-              <a:t>Messaging</a:t>
-            </a:r>
-          </a:p>
-          <a:p>
-            <a:pPr marL="914400" lvl="1" indent="-457200">
-              <a:buClr>
-                <a:srgbClr val="0070C0"/>
-              </a:buClr>
-              <a:buFont typeface="Wingdings" panose="05000000000000000000" pitchFamily="2" charset="2"/>
-              <a:buChar char="Ø"/>
-            </a:pPr>
-            <a:r>
-              <a:rPr lang="en-US" sz="2800" dirty="0"/>
-              <a:t>Send message</a:t>
-            </a:r>
-          </a:p>
-          <a:p>
-            <a:pPr marL="914400" lvl="1" indent="-457200">
-              <a:buClr>
-                <a:srgbClr val="0070C0"/>
-              </a:buClr>
-              <a:buFont typeface="Wingdings" panose="05000000000000000000" pitchFamily="2" charset="2"/>
-              <a:buChar char="Ø"/>
-            </a:pPr>
-            <a:r>
-              <a:rPr lang="en-US" sz="2800" dirty="0"/>
-              <a:t>View Message</a:t>
-            </a:r>
-          </a:p>
-          <a:p>
-            <a:pPr marL="914400" lvl="1" indent="-457200">
-              <a:buClr>
-                <a:srgbClr val="0070C0"/>
-              </a:buClr>
-              <a:buFont typeface="Wingdings" panose="05000000000000000000" pitchFamily="2" charset="2"/>
-              <a:buChar char="Ø"/>
-            </a:pPr>
-            <a:r>
-              <a:rPr lang="en-US" sz="2800" dirty="0"/>
-              <a:t>Inbox Icon</a:t>
-            </a:r>
-          </a:p>
-          <a:p>
-            <a:pPr marL="914400" lvl="1" indent="-457200">
-              <a:buFont typeface="Wingdings" panose="05000000000000000000" pitchFamily="2" charset="2"/>
-              <a:buChar char="Ø"/>
-            </a:pPr>
-            <a:endParaRPr lang="en-US" sz="2800" dirty="0" smtClean="0"/>
-          </a:p>
-        </p:txBody>
-      </p:sp>
-      <p:pic>
-        <p:nvPicPr>
-          <p:cNvPr id="9" name="Picture 8"/>
-          <p:cNvPicPr>
-            <a:picLocks noChangeAspect="1"/>
-          </p:cNvPicPr>
-          <p:nvPr/>
-        </p:nvPicPr>
-        <p:blipFill>
-          <a:blip r:embed="rId2">
-            <a:extLst>
-              <a:ext uri="{28A0092B-C50C-407E-A947-70E740481C1C}">
-                <a14:useLocalDpi xmlns:a14="http://schemas.microsoft.com/office/drawing/2010/main" val="0"/>
-              </a:ext>
-            </a:extLst>
-          </a:blip>
-          <a:stretch>
-            <a:fillRect/>
-          </a:stretch>
-        </p:blipFill>
-        <p:spPr>
-          <a:xfrm>
-            <a:off x="195355" y="1023586"/>
-            <a:ext cx="3054647" cy="2499257"/>
-          </a:xfrm>
-          <a:prstGeom prst="rect">
-            <a:avLst/>
-          </a:prstGeom>
-        </p:spPr>
-      </p:pic>
-    </p:spTree>
-    <p:extLst>
-      <p:ext uri="{BB962C8B-B14F-4D97-AF65-F5344CB8AC3E}">
-        <p14:creationId xmlns:p14="http://schemas.microsoft.com/office/powerpoint/2010/main" val="827005068"/>
-      </p:ext>
-    </p:extLst>
-  </p:cSld>
-  <p:clrMapOvr>
-    <a:masterClrMapping/>
-  </p:clrMapOvr>
-  <p:timing>
-    <p:tnLst>
-      <p:par>
-        <p:cTn id="1" dur="indefinite" restart="never" nodeType="tmRoot"/>
-      </p:par>
-    </p:tnLst>
-  </p:timing>
-</p:sld>
-</file>
-
-<file path=ppt/slides/slide3.xml><?xml version="1.0" encoding="utf-8"?>
-<p:sld xmlns:a="http://schemas.openxmlformats.org/drawingml/2006/main" xmlns:r="http://schemas.openxmlformats.org/officeDocument/2006/relationships" xmlns:p="http://schemas.openxmlformats.org/presentationml/2006/main">
-  <p:cSld>
-    <p:spTree>
-      <p:nvGrpSpPr>
-        <p:cNvPr id="1" name=""/>
-        <p:cNvGrpSpPr/>
-        <p:nvPr/>
-      </p:nvGrpSpPr>
-      <p:grpSpPr>
-        <a:xfrm>
-          <a:off x="0" y="0"/>
-          <a:ext cx="0" cy="0"/>
-          <a:chOff x="0" y="0"/>
-          <a:chExt cx="0" cy="0"/>
-        </a:xfrm>
-      </p:grpSpPr>
-      <p:sp>
-        <p:nvSpPr>
-          <p:cNvPr id="10" name="TextBox 9"/>
-          <p:cNvSpPr txBox="1"/>
-          <p:nvPr/>
-        </p:nvSpPr>
-        <p:spPr>
-          <a:xfrm>
-            <a:off x="3640348" y="724619"/>
-            <a:ext cx="5589917" cy="523220"/>
-          </a:xfrm>
-          <a:prstGeom prst="rect">
-            <a:avLst/>
-          </a:prstGeom>
-          <a:noFill/>
-        </p:spPr>
-        <p:txBody>
-          <a:bodyPr wrap="square" rtlCol="0">
-            <a:spAutoFit/>
-          </a:bodyPr>
-          <a:lstStyle/>
-          <a:p>
-            <a:r>
-              <a:rPr lang="en-US" sz="2800" b="1" dirty="0" smtClean="0"/>
-              <a:t>Product Demo</a:t>
-            </a:r>
-            <a:endParaRPr lang="en-US" sz="2800" b="1" dirty="0"/>
-          </a:p>
-        </p:txBody>
-      </p:sp>
-      <p:sp>
-        <p:nvSpPr>
-          <p:cNvPr id="11" name="TextBox 10"/>
-          <p:cNvSpPr txBox="1"/>
-          <p:nvPr/>
-        </p:nvSpPr>
-        <p:spPr>
-          <a:xfrm>
-            <a:off x="3640348" y="1401279"/>
-            <a:ext cx="5589917" cy="6555641"/>
-          </a:xfrm>
-          <a:prstGeom prst="rect">
-            <a:avLst/>
-          </a:prstGeom>
-          <a:noFill/>
-        </p:spPr>
-        <p:txBody>
-          <a:bodyPr wrap="square" rtlCol="0">
-            <a:spAutoFit/>
-          </a:bodyPr>
-          <a:lstStyle/>
-          <a:p>
-            <a:pPr marL="457200" indent="-457200">
-              <a:buClr>
-                <a:srgbClr val="0070C0"/>
-              </a:buClr>
-              <a:buFont typeface="Wingdings" panose="05000000000000000000" pitchFamily="2" charset="2"/>
-              <a:buChar char="Ø"/>
-            </a:pPr>
-            <a:r>
-              <a:rPr lang="en-US" sz="2800" dirty="0"/>
-              <a:t>Routine</a:t>
-            </a:r>
-          </a:p>
-          <a:p>
-            <a:pPr marL="914400" lvl="1" indent="-457200">
-              <a:buClr>
-                <a:srgbClr val="0070C0"/>
-              </a:buClr>
-              <a:buFont typeface="Wingdings" panose="05000000000000000000" pitchFamily="2" charset="2"/>
-              <a:buChar char="Ø"/>
-            </a:pPr>
-            <a:r>
-              <a:rPr lang="en-US" sz="2800" dirty="0"/>
-              <a:t>Create Routine</a:t>
-            </a:r>
-          </a:p>
-          <a:p>
-            <a:pPr marL="1371600" lvl="2" indent="-457200">
-              <a:buClr>
-                <a:srgbClr val="0070C0"/>
-              </a:buClr>
-              <a:buFont typeface="Wingdings" panose="05000000000000000000" pitchFamily="2" charset="2"/>
-              <a:buChar char="Ø"/>
-            </a:pPr>
-            <a:r>
-              <a:rPr lang="en-US" sz="2800" dirty="0"/>
-              <a:t>Add Exercise</a:t>
-            </a:r>
-          </a:p>
-          <a:p>
-            <a:pPr marL="914400" lvl="1" indent="-457200">
-              <a:buClr>
-                <a:srgbClr val="0070C0"/>
-              </a:buClr>
-              <a:buFont typeface="Wingdings" panose="05000000000000000000" pitchFamily="2" charset="2"/>
-              <a:buChar char="Ø"/>
-            </a:pPr>
-            <a:r>
-              <a:rPr lang="en-US" sz="2800" dirty="0"/>
-              <a:t>View Routine Info Page</a:t>
-            </a:r>
-          </a:p>
-          <a:p>
-            <a:pPr marL="914400" lvl="1" indent="-457200">
-              <a:buClr>
-                <a:srgbClr val="0070C0"/>
-              </a:buClr>
-              <a:buFont typeface="Wingdings" panose="05000000000000000000" pitchFamily="2" charset="2"/>
-              <a:buChar char="Ø"/>
-            </a:pPr>
-            <a:r>
-              <a:rPr lang="en-US" sz="2800" dirty="0"/>
-              <a:t>Edit Routine</a:t>
-            </a:r>
-          </a:p>
-          <a:p>
-            <a:pPr marL="457200" indent="-457200">
-              <a:buClr>
-                <a:srgbClr val="0070C0"/>
-              </a:buClr>
-              <a:buFont typeface="Wingdings" panose="05000000000000000000" pitchFamily="2" charset="2"/>
-              <a:buChar char="Ø"/>
-            </a:pPr>
-            <a:r>
-              <a:rPr lang="en-US" sz="2800" dirty="0"/>
-              <a:t>Exercises</a:t>
-            </a:r>
-          </a:p>
-          <a:p>
-            <a:pPr marL="914400" lvl="1" indent="-457200">
-              <a:buClr>
-                <a:srgbClr val="0070C0"/>
-              </a:buClr>
-              <a:buFont typeface="Wingdings" panose="05000000000000000000" pitchFamily="2" charset="2"/>
-              <a:buChar char="Ø"/>
-            </a:pPr>
-            <a:r>
-              <a:rPr lang="en-US" sz="2800" dirty="0"/>
-              <a:t>View Exercise Info Page</a:t>
-            </a:r>
-          </a:p>
-          <a:p>
-            <a:pPr marL="914400" lvl="1" indent="-457200">
-              <a:buClr>
-                <a:srgbClr val="0070C0"/>
-              </a:buClr>
-              <a:buFont typeface="Wingdings" panose="05000000000000000000" pitchFamily="2" charset="2"/>
-              <a:buChar char="Ø"/>
-            </a:pPr>
-            <a:r>
-              <a:rPr lang="en-US" sz="2800" dirty="0"/>
-              <a:t>Edit Exercise</a:t>
-            </a:r>
-          </a:p>
-          <a:p>
-            <a:pPr marL="457200" indent="-457200">
-              <a:buClr>
-                <a:srgbClr val="0070C0"/>
-              </a:buClr>
-              <a:buFont typeface="Wingdings" panose="05000000000000000000" pitchFamily="2" charset="2"/>
-              <a:buChar char="Ø"/>
-            </a:pPr>
-            <a:r>
-              <a:rPr lang="en-US" sz="2800" dirty="0"/>
-              <a:t>Log</a:t>
-            </a:r>
-          </a:p>
-          <a:p>
-            <a:pPr marL="914400" lvl="1" indent="-457200">
-              <a:buClr>
-                <a:srgbClr val="0070C0"/>
-              </a:buClr>
-              <a:buFont typeface="Wingdings" panose="05000000000000000000" pitchFamily="2" charset="2"/>
-              <a:buChar char="Ø"/>
-            </a:pPr>
-            <a:r>
-              <a:rPr lang="en-US" sz="2800" dirty="0"/>
-              <a:t>Start Routine</a:t>
-            </a:r>
-          </a:p>
-          <a:p>
-            <a:pPr marL="914400" lvl="1" indent="-457200">
-              <a:buClr>
-                <a:srgbClr val="0070C0"/>
-              </a:buClr>
-              <a:buFont typeface="Wingdings" panose="05000000000000000000" pitchFamily="2" charset="2"/>
-              <a:buChar char="Ø"/>
-            </a:pPr>
-            <a:r>
-              <a:rPr lang="en-US" sz="2800" dirty="0"/>
-              <a:t>View Log/Explain Stats</a:t>
-            </a:r>
-          </a:p>
-          <a:p>
-            <a:pPr marL="914400" lvl="1" indent="-457200">
-              <a:buClr>
-                <a:srgbClr val="0070C0"/>
-              </a:buClr>
-              <a:buFont typeface="Wingdings" panose="05000000000000000000" pitchFamily="2" charset="2"/>
-              <a:buChar char="Ø"/>
-            </a:pPr>
-            <a:endParaRPr lang="en-US" sz="2800" dirty="0" smtClean="0"/>
-          </a:p>
-          <a:p>
-            <a:pPr marL="914400" lvl="1" indent="-457200">
-              <a:buClr>
-                <a:schemeClr val="accent1">
-                  <a:lumMod val="75000"/>
-                </a:schemeClr>
-              </a:buClr>
-              <a:buFont typeface="Wingdings" panose="05000000000000000000" pitchFamily="2" charset="2"/>
-              <a:buChar char="Ø"/>
-            </a:pPr>
-            <a:endParaRPr lang="en-US" sz="2800" dirty="0" smtClean="0"/>
-          </a:p>
-          <a:p>
-            <a:pPr marL="457200" indent="-457200">
-              <a:buFont typeface="Wingdings" panose="05000000000000000000" pitchFamily="2" charset="2"/>
-              <a:buChar char="Ø"/>
-            </a:pPr>
-            <a:endParaRPr lang="en-US" sz="2800" dirty="0" smtClean="0"/>
-          </a:p>
-          <a:p>
-            <a:pPr marL="914400" lvl="1" indent="-457200">
-              <a:buFont typeface="Wingdings" panose="05000000000000000000" pitchFamily="2" charset="2"/>
-              <a:buChar char="Ø"/>
-            </a:pPr>
-            <a:endParaRPr lang="en-US" sz="2800" dirty="0" smtClean="0"/>
-          </a:p>
-        </p:txBody>
-      </p:sp>
-      <p:pic>
-        <p:nvPicPr>
-          <p:cNvPr id="9" name="Picture 8"/>
-          <p:cNvPicPr>
-            <a:picLocks noChangeAspect="1"/>
-          </p:cNvPicPr>
-          <p:nvPr/>
-        </p:nvPicPr>
-        <p:blipFill>
-          <a:blip r:embed="rId2">
-            <a:extLst>
-              <a:ext uri="{28A0092B-C50C-407E-A947-70E740481C1C}">
-                <a14:useLocalDpi xmlns:a14="http://schemas.microsoft.com/office/drawing/2010/main" val="0"/>
-              </a:ext>
-            </a:extLst>
-          </a:blip>
-          <a:stretch>
-            <a:fillRect/>
-          </a:stretch>
-        </p:blipFill>
-        <p:spPr>
-          <a:xfrm>
-            <a:off x="195355" y="1023586"/>
-            <a:ext cx="3054647" cy="2499257"/>
-          </a:xfrm>
-          <a:prstGeom prst="rect">
-            <a:avLst/>
-          </a:prstGeom>
-        </p:spPr>
-      </p:pic>
-    </p:spTree>
-    <p:extLst>
-      <p:ext uri="{BB962C8B-B14F-4D97-AF65-F5344CB8AC3E}">
-        <p14:creationId xmlns:p14="http://schemas.microsoft.com/office/powerpoint/2010/main" val="2133008192"/>
-      </p:ext>
-    </p:extLst>
-  </p:cSld>
-  <p:clrMapOvr>
-    <a:masterClrMapping/>
-  </p:clrMapOvr>
-  <p:timing>
-    <p:tnLst>
-      <p:par>
-        <p:cTn id="1" dur="indefinite" restart="never" nodeType="tmRoot"/>
-      </p:par>
-    </p:tnLst>
-  </p:timing>
-</p:sld>
-</file>
-
-<file path=ppt/slides/slide4.xml><?xml version="1.0" encoding="utf-8"?>
-<p:sld xmlns:a="http://schemas.openxmlformats.org/drawingml/2006/main" xmlns:r="http://schemas.openxmlformats.org/officeDocument/2006/relationships" xmlns:p="http://schemas.openxmlformats.org/presentationml/2006/main">
-  <p:cSld>
-    <p:spTree>
-      <p:nvGrpSpPr>
-        <p:cNvPr id="1" name=""/>
-        <p:cNvGrpSpPr/>
-        <p:nvPr/>
-      </p:nvGrpSpPr>
-      <p:grpSpPr>
-        <a:xfrm>
-          <a:off x="0" y="0"/>
-          <a:ext cx="0" cy="0"/>
-          <a:chOff x="0" y="0"/>
-          <a:chExt cx="0" cy="0"/>
-        </a:xfrm>
-      </p:grpSpPr>
-      <p:sp>
-        <p:nvSpPr>
-          <p:cNvPr id="10" name="TextBox 9"/>
-          <p:cNvSpPr txBox="1"/>
-          <p:nvPr/>
-        </p:nvSpPr>
-        <p:spPr>
-          <a:xfrm>
-            <a:off x="3640348" y="724619"/>
-            <a:ext cx="5589917" cy="523220"/>
-          </a:xfrm>
-          <a:prstGeom prst="rect">
-            <a:avLst/>
-          </a:prstGeom>
-          <a:noFill/>
-        </p:spPr>
-        <p:txBody>
-          <a:bodyPr wrap="square" rtlCol="0">
-            <a:spAutoFit/>
-          </a:bodyPr>
-          <a:lstStyle/>
-          <a:p>
-            <a:r>
-              <a:rPr lang="en-US" sz="2800" b="1" dirty="0" smtClean="0"/>
-              <a:t>Product Demo</a:t>
-            </a:r>
-            <a:endParaRPr lang="en-US" sz="2800" b="1" dirty="0"/>
-          </a:p>
-        </p:txBody>
-      </p:sp>
-      <p:sp>
-        <p:nvSpPr>
-          <p:cNvPr id="11" name="TextBox 10"/>
-          <p:cNvSpPr txBox="1"/>
-          <p:nvPr/>
-        </p:nvSpPr>
-        <p:spPr>
-          <a:xfrm>
-            <a:off x="3640348" y="1401279"/>
-            <a:ext cx="5589917" cy="4832092"/>
-          </a:xfrm>
-          <a:prstGeom prst="rect">
-            <a:avLst/>
-          </a:prstGeom>
-          <a:noFill/>
-        </p:spPr>
-        <p:txBody>
-          <a:bodyPr wrap="square" rtlCol="0">
-            <a:spAutoFit/>
-          </a:bodyPr>
-          <a:lstStyle/>
-          <a:p>
-            <a:pPr marL="457200" indent="-457200">
-              <a:buClr>
-                <a:srgbClr val="0070C0"/>
-              </a:buClr>
-              <a:buFont typeface="Wingdings" panose="05000000000000000000" pitchFamily="2" charset="2"/>
-              <a:buChar char="Ø"/>
-            </a:pPr>
-            <a:r>
-              <a:rPr lang="en-US" sz="2800" dirty="0" smtClean="0"/>
-              <a:t>Calendar</a:t>
-            </a:r>
-          </a:p>
-          <a:p>
-            <a:pPr marL="914400" lvl="1" indent="-457200">
-              <a:buClr>
-                <a:srgbClr val="0070C0"/>
-              </a:buClr>
-              <a:buFont typeface="Wingdings" panose="05000000000000000000" pitchFamily="2" charset="2"/>
-              <a:buChar char="Ø"/>
-            </a:pPr>
-            <a:r>
-              <a:rPr lang="en-US" sz="2800" dirty="0" smtClean="0"/>
-              <a:t>Time Frame</a:t>
-            </a:r>
-          </a:p>
-          <a:p>
-            <a:pPr marL="914400" lvl="1" indent="-457200">
-              <a:buClr>
-                <a:srgbClr val="0070C0"/>
-              </a:buClr>
-              <a:buFont typeface="Wingdings" panose="05000000000000000000" pitchFamily="2" charset="2"/>
-              <a:buChar char="Ø"/>
-            </a:pPr>
-            <a:r>
-              <a:rPr lang="en-US" sz="2800" dirty="0" smtClean="0"/>
-              <a:t>Add Events</a:t>
-            </a:r>
-          </a:p>
-          <a:p>
-            <a:pPr marL="914400" lvl="1" indent="-457200">
-              <a:buClr>
-                <a:srgbClr val="0070C0"/>
-              </a:buClr>
-              <a:buFont typeface="Wingdings" panose="05000000000000000000" pitchFamily="2" charset="2"/>
-              <a:buChar char="Ø"/>
-            </a:pPr>
-            <a:r>
-              <a:rPr lang="en-US" sz="2800" dirty="0" smtClean="0"/>
-              <a:t>View Events</a:t>
-            </a:r>
-          </a:p>
-          <a:p>
-            <a:pPr marL="457200" indent="-457200">
-              <a:buClr>
-                <a:srgbClr val="0070C0"/>
-              </a:buClr>
-              <a:buFont typeface="Wingdings" panose="05000000000000000000" pitchFamily="2" charset="2"/>
-              <a:buChar char="Ø"/>
-            </a:pPr>
-            <a:r>
-              <a:rPr lang="en-US" sz="2800" dirty="0" smtClean="0"/>
-              <a:t>Challenges</a:t>
-            </a:r>
-          </a:p>
-          <a:p>
-            <a:pPr marL="914400" lvl="1" indent="-457200">
-              <a:buClr>
-                <a:srgbClr val="0070C0"/>
-              </a:buClr>
-              <a:buFont typeface="Wingdings" panose="05000000000000000000" pitchFamily="2" charset="2"/>
-              <a:buChar char="Ø"/>
-            </a:pPr>
-            <a:r>
-              <a:rPr lang="en-US" sz="2800" dirty="0" smtClean="0"/>
-              <a:t>Add Challenge</a:t>
-            </a:r>
-          </a:p>
-          <a:p>
-            <a:pPr marL="914400" lvl="1" indent="-457200">
-              <a:buClr>
-                <a:srgbClr val="0070C0"/>
-              </a:buClr>
-              <a:buFont typeface="Wingdings" panose="05000000000000000000" pitchFamily="2" charset="2"/>
-              <a:buChar char="Ø"/>
-            </a:pPr>
-            <a:r>
-              <a:rPr lang="en-US" sz="2800" dirty="0" smtClean="0"/>
-              <a:t>View Challenge</a:t>
-            </a:r>
-          </a:p>
-          <a:p>
-            <a:pPr marL="914400" lvl="1" indent="-457200">
-              <a:buClr>
-                <a:srgbClr val="0070C0"/>
-              </a:buClr>
-              <a:buFont typeface="Wingdings" panose="05000000000000000000" pitchFamily="2" charset="2"/>
-              <a:buChar char="Ø"/>
-            </a:pPr>
-            <a:endParaRPr lang="en-US" sz="2800" dirty="0" smtClean="0"/>
-          </a:p>
-          <a:p>
-            <a:pPr marL="914400" lvl="1" indent="-457200">
-              <a:buClr>
-                <a:schemeClr val="accent1">
-                  <a:lumMod val="75000"/>
-                </a:schemeClr>
-              </a:buClr>
-              <a:buFont typeface="Wingdings" panose="05000000000000000000" pitchFamily="2" charset="2"/>
-              <a:buChar char="Ø"/>
-            </a:pPr>
-            <a:endParaRPr lang="en-US" sz="2800" dirty="0" smtClean="0"/>
-          </a:p>
-          <a:p>
-            <a:pPr marL="457200" indent="-457200">
-              <a:buFont typeface="Wingdings" panose="05000000000000000000" pitchFamily="2" charset="2"/>
-              <a:buChar char="Ø"/>
-            </a:pPr>
-            <a:endParaRPr lang="en-US" sz="2800" dirty="0" smtClean="0"/>
-          </a:p>
-          <a:p>
-            <a:pPr marL="914400" lvl="1" indent="-457200">
-              <a:buFont typeface="Wingdings" panose="05000000000000000000" pitchFamily="2" charset="2"/>
-              <a:buChar char="Ø"/>
-            </a:pPr>
-            <a:endParaRPr lang="en-US" sz="2800" dirty="0" smtClean="0"/>
-          </a:p>
-        </p:txBody>
-      </p:sp>
-      <p:pic>
-        <p:nvPicPr>
-          <p:cNvPr id="9" name="Picture 8"/>
-          <p:cNvPicPr>
-            <a:picLocks noChangeAspect="1"/>
-          </p:cNvPicPr>
-          <p:nvPr/>
-        </p:nvPicPr>
-        <p:blipFill>
-          <a:blip r:embed="rId2">
-            <a:extLst>
-              <a:ext uri="{28A0092B-C50C-407E-A947-70E740481C1C}">
-                <a14:useLocalDpi xmlns:a14="http://schemas.microsoft.com/office/drawing/2010/main" val="0"/>
-              </a:ext>
-            </a:extLst>
-          </a:blip>
-          <a:stretch>
-            <a:fillRect/>
-          </a:stretch>
-        </p:blipFill>
-        <p:spPr>
-          <a:xfrm>
-            <a:off x="195355" y="1023586"/>
-            <a:ext cx="3054647" cy="2499257"/>
-          </a:xfrm>
-          <a:prstGeom prst="rect">
-            <a:avLst/>
-          </a:prstGeom>
-        </p:spPr>
-      </p:pic>
-    </p:spTree>
-    <p:extLst>
-      <p:ext uri="{BB962C8B-B14F-4D97-AF65-F5344CB8AC3E}">
-        <p14:creationId xmlns:p14="http://schemas.microsoft.com/office/powerpoint/2010/main" val="2431153840"/>
-      </p:ext>
-    </p:extLst>
-  </p:cSld>
-  <p:clrMapOvr>
-    <a:masterClrMapping/>
-  </p:clrMapOvr>
-  <p:timing>
-    <p:tnLst>
-      <p:par>
-        <p:cTn id="1" dur="indefinite" restart="never" nodeType="tmRoot"/>
-      </p:par>
-    </p:tnLst>
-  </p:timing>
-</p:sld>
-</file>
-
-<file path=ppt/slides/slide5.xml><?xml version="1.0" encoding="utf-8"?>
-<p:sld xmlns:a="http://schemas.openxmlformats.org/drawingml/2006/main" xmlns:r="http://schemas.openxmlformats.org/officeDocument/2006/relationships" xmlns:p="http://schemas.openxmlformats.org/presentationml/2006/main">
-  <p:cSld>
-    <p:spTree>
-      <p:nvGrpSpPr>
-        <p:cNvPr id="1" name=""/>
-        <p:cNvGrpSpPr/>
-        <p:nvPr/>
-      </p:nvGrpSpPr>
-      <p:grpSpPr>
-        <a:xfrm>
-          <a:off x="0" y="0"/>
-          <a:ext cx="0" cy="0"/>
-          <a:chOff x="0" y="0"/>
-          <a:chExt cx="0" cy="0"/>
-        </a:xfrm>
-      </p:grpSpPr>
-      <p:sp>
-        <p:nvSpPr>
-          <p:cNvPr id="10" name="TextBox 9"/>
-          <p:cNvSpPr txBox="1"/>
-          <p:nvPr/>
-        </p:nvSpPr>
-        <p:spPr>
-          <a:xfrm>
-            <a:off x="3640348" y="724619"/>
-            <a:ext cx="5589917" cy="523220"/>
-          </a:xfrm>
-          <a:prstGeom prst="rect">
-            <a:avLst/>
-          </a:prstGeom>
-          <a:noFill/>
-        </p:spPr>
-        <p:txBody>
-          <a:bodyPr wrap="square" rtlCol="0">
-            <a:spAutoFit/>
-          </a:bodyPr>
-          <a:lstStyle/>
-          <a:p>
-            <a:r>
-              <a:rPr lang="en-US" sz="2800" b="1" dirty="0" smtClean="0"/>
-              <a:t>Current Bugs</a:t>
-            </a:r>
-            <a:endParaRPr lang="en-US" sz="2800" b="1" dirty="0"/>
-          </a:p>
-        </p:txBody>
-      </p:sp>
-      <p:sp>
-        <p:nvSpPr>
-          <p:cNvPr id="11" name="TextBox 10"/>
-          <p:cNvSpPr txBox="1"/>
-          <p:nvPr/>
-        </p:nvSpPr>
-        <p:spPr>
-          <a:xfrm>
-            <a:off x="3459116" y="1365273"/>
-            <a:ext cx="8212184" cy="2677656"/>
-          </a:xfrm>
-          <a:prstGeom prst="rect">
-            <a:avLst/>
-          </a:prstGeom>
-          <a:noFill/>
-        </p:spPr>
-        <p:txBody>
-          <a:bodyPr wrap="square" rtlCol="0">
-            <a:spAutoFit/>
-          </a:bodyPr>
-          <a:lstStyle/>
-          <a:p>
-            <a:pPr marL="914400" lvl="1" indent="-457200">
-              <a:buClr>
-                <a:srgbClr val="0070C0"/>
-              </a:buClr>
-              <a:buFont typeface="Wingdings" panose="05000000000000000000" pitchFamily="2" charset="2"/>
-              <a:buChar char="Ø"/>
-            </a:pPr>
-            <a:r>
-              <a:rPr lang="en-US" sz="2800" dirty="0" smtClean="0"/>
-              <a:t>Set Order: </a:t>
-            </a:r>
-            <a:r>
-              <a:rPr lang="en-US" sz="2800" dirty="0" smtClean="0"/>
-              <a:t>In </a:t>
-            </a:r>
-            <a:r>
-              <a:rPr lang="en-US" sz="2800" dirty="0" err="1" smtClean="0"/>
-              <a:t>view_exercises.php</a:t>
-            </a:r>
-            <a:r>
-              <a:rPr lang="en-US" sz="2800" dirty="0" smtClean="0"/>
-              <a:t> or Exercise Info, the set order sometimes shows in reverse order</a:t>
-            </a:r>
-          </a:p>
-          <a:p>
-            <a:pPr marL="914400" lvl="1" indent="-457200">
-              <a:buClr>
-                <a:srgbClr val="0070C0"/>
-              </a:buClr>
-              <a:buFont typeface="Wingdings" panose="05000000000000000000" pitchFamily="2" charset="2"/>
-              <a:buChar char="Ø"/>
-            </a:pPr>
-            <a:endParaRPr lang="en-US" sz="2800" dirty="0" smtClean="0"/>
-          </a:p>
-          <a:p>
-            <a:endParaRPr lang="en-US" sz="2800" dirty="0" smtClean="0"/>
-          </a:p>
-          <a:p>
-            <a:pPr marL="914400" lvl="1" indent="-457200">
-              <a:buFont typeface="Wingdings" panose="05000000000000000000" pitchFamily="2" charset="2"/>
-              <a:buChar char="Ø"/>
-            </a:pPr>
-            <a:endParaRPr lang="en-US" sz="2800" dirty="0" smtClean="0"/>
-          </a:p>
-        </p:txBody>
-      </p:sp>
-      <p:pic>
-        <p:nvPicPr>
-          <p:cNvPr id="9" name="Picture 8"/>
-          <p:cNvPicPr>
-            <a:picLocks noChangeAspect="1"/>
-          </p:cNvPicPr>
-          <p:nvPr/>
-        </p:nvPicPr>
-        <p:blipFill>
-          <a:blip r:embed="rId2">
-            <a:extLst>
-              <a:ext uri="{28A0092B-C50C-407E-A947-70E740481C1C}">
-                <a14:useLocalDpi xmlns:a14="http://schemas.microsoft.com/office/drawing/2010/main" val="0"/>
-              </a:ext>
-            </a:extLst>
-          </a:blip>
-          <a:stretch>
-            <a:fillRect/>
-          </a:stretch>
-        </p:blipFill>
-        <p:spPr>
-          <a:xfrm>
-            <a:off x="195355" y="1023586"/>
-            <a:ext cx="3054647" cy="2499257"/>
-          </a:xfrm>
-          <a:prstGeom prst="rect">
-            <a:avLst/>
-          </a:prstGeom>
-        </p:spPr>
-      </p:pic>
-      <p:pic>
-        <p:nvPicPr>
-          <p:cNvPr id="2" name="Picture 1"/>
-          <p:cNvPicPr>
-            <a:picLocks noChangeAspect="1"/>
-          </p:cNvPicPr>
-          <p:nvPr/>
-        </p:nvPicPr>
-        <p:blipFill>
-          <a:blip r:embed="rId3"/>
-          <a:stretch>
-            <a:fillRect/>
-          </a:stretch>
-        </p:blipFill>
-        <p:spPr>
-          <a:xfrm>
-            <a:off x="7721600" y="2361047"/>
-            <a:ext cx="3835400" cy="4392602"/>
-          </a:xfrm>
-          <a:prstGeom prst="rect">
-            <a:avLst/>
-          </a:prstGeom>
-        </p:spPr>
-      </p:pic>
-    </p:spTree>
-    <p:extLst>
-      <p:ext uri="{BB962C8B-B14F-4D97-AF65-F5344CB8AC3E}">
-        <p14:creationId xmlns:p14="http://schemas.microsoft.com/office/powerpoint/2010/main" val="1391420568"/>
-      </p:ext>
-    </p:extLst>
-  </p:cSld>
-  <p:clrMapOvr>
-    <a:masterClrMapping/>
-  </p:clrMapOvr>
-  <p:timing>
-    <p:tnLst>
-      <p:par>
-        <p:cTn id="1" dur="indefinite" restart="never" nodeType="tmRoot"/>
-      </p:par>
-    </p:tnLst>
-  </p:timing>
-</p:sld>
-</file>
-
-<file path=ppt/slides/slide6.xml><?xml version="1.0" encoding="utf-8"?>
-<p:sld xmlns:a="http://schemas.openxmlformats.org/drawingml/2006/main" xmlns:r="http://schemas.openxmlformats.org/officeDocument/2006/relationships" xmlns:p="http://schemas.openxmlformats.org/presentationml/2006/main">
-  <p:cSld>
-    <p:spTree>
-      <p:nvGrpSpPr>
-        <p:cNvPr id="1" name=""/>
-        <p:cNvGrpSpPr/>
-        <p:nvPr/>
-      </p:nvGrpSpPr>
-      <p:grpSpPr>
-        <a:xfrm>
-          <a:off x="0" y="0"/>
-          <a:ext cx="0" cy="0"/>
-          <a:chOff x="0" y="0"/>
-          <a:chExt cx="0" cy="0"/>
-        </a:xfrm>
-      </p:grpSpPr>
-      <p:sp>
-        <p:nvSpPr>
-          <p:cNvPr id="10" name="TextBox 9"/>
-          <p:cNvSpPr txBox="1"/>
-          <p:nvPr/>
-        </p:nvSpPr>
-        <p:spPr>
-          <a:xfrm>
-            <a:off x="3640348" y="724619"/>
-            <a:ext cx="5589917" cy="523220"/>
-          </a:xfrm>
-          <a:prstGeom prst="rect">
-            <a:avLst/>
-          </a:prstGeom>
-          <a:noFill/>
-        </p:spPr>
-        <p:txBody>
-          <a:bodyPr wrap="square" rtlCol="0">
-            <a:spAutoFit/>
-          </a:bodyPr>
-          <a:lstStyle/>
-          <a:p>
-            <a:r>
-              <a:rPr lang="en-US" sz="2800" b="1" dirty="0"/>
-              <a:t>Deployment Plan</a:t>
-            </a:r>
-          </a:p>
-        </p:txBody>
-      </p:sp>
-      <p:pic>
-        <p:nvPicPr>
-          <p:cNvPr id="9" name="Picture 8"/>
-          <p:cNvPicPr>
-            <a:picLocks noChangeAspect="1"/>
-          </p:cNvPicPr>
-          <p:nvPr/>
-        </p:nvPicPr>
-        <p:blipFill>
-          <a:blip r:embed="rId2">
-            <a:extLst>
-              <a:ext uri="{28A0092B-C50C-407E-A947-70E740481C1C}">
-                <a14:useLocalDpi xmlns:a14="http://schemas.microsoft.com/office/drawing/2010/main" val="0"/>
-              </a:ext>
-            </a:extLst>
-          </a:blip>
-          <a:stretch>
-            <a:fillRect/>
-          </a:stretch>
-        </p:blipFill>
-        <p:spPr>
-          <a:xfrm>
-            <a:off x="195355" y="1023586"/>
-            <a:ext cx="3054647" cy="2499257"/>
-          </a:xfrm>
-          <a:prstGeom prst="rect">
-            <a:avLst/>
-          </a:prstGeom>
-        </p:spPr>
-      </p:pic>
-      <p:graphicFrame>
-        <p:nvGraphicFramePr>
-          <p:cNvPr id="2" name="Table 1"/>
-          <p:cNvGraphicFramePr>
-            <a:graphicFrameLocks noGrp="1"/>
-          </p:cNvGraphicFramePr>
-          <p:nvPr>
-            <p:extLst>
-              <p:ext uri="{D42A27DB-BD31-4B8C-83A1-F6EECF244321}">
-                <p14:modId xmlns:p14="http://schemas.microsoft.com/office/powerpoint/2010/main" val="2174365923"/>
-              </p:ext>
-            </p:extLst>
-          </p:nvPr>
-        </p:nvGraphicFramePr>
-        <p:xfrm>
-          <a:off x="3804156" y="1669547"/>
-          <a:ext cx="7194044" cy="4540752"/>
-        </p:xfrm>
-        <a:graphic>
-          <a:graphicData uri="http://schemas.openxmlformats.org/drawingml/2006/table">
-            <a:tbl>
-              <a:tblPr firstRow="1" firstCol="1" bandRow="1">
-                <a:tableStyleId>{5C22544A-7EE6-4342-B048-85BDC9FD1C3A}</a:tableStyleId>
-              </a:tblPr>
-              <a:tblGrid>
-                <a:gridCol w="2693860"/>
-                <a:gridCol w="4500184"/>
-              </a:tblGrid>
-              <a:tr h="756792">
-                <a:tc>
-                  <a:txBody>
-                    <a:bodyPr/>
-                    <a:lstStyle/>
-                    <a:p>
-                      <a:pPr marL="0" marR="0">
-                        <a:lnSpc>
-                          <a:spcPct val="115000"/>
-                        </a:lnSpc>
-                        <a:spcBef>
-                          <a:spcPts val="0"/>
-                        </a:spcBef>
-                        <a:spcAft>
-                          <a:spcPts val="0"/>
-                        </a:spcAft>
-                      </a:pPr>
-                      <a:r>
-                        <a:rPr lang="en-US" sz="2400" dirty="0">
-                          <a:effectLst/>
-                        </a:rPr>
-                        <a:t>Deployment </a:t>
-                      </a:r>
-                      <a:endParaRPr lang="en-US" sz="2400" dirty="0">
-                        <a:effectLst/>
-                        <a:latin typeface="Calibri" panose="020F0502020204030204" pitchFamily="34" charset="0"/>
-                        <a:ea typeface="Calibri" panose="020F0502020204030204" pitchFamily="34" charset="0"/>
-                        <a:cs typeface="Times New Roman" panose="02020603050405020304" pitchFamily="18" charset="0"/>
-                      </a:endParaRPr>
-                    </a:p>
-                  </a:txBody>
-                  <a:tcPr marL="68580" marR="68580" marT="0" marB="0"/>
-                </a:tc>
-                <a:tc>
-                  <a:txBody>
-                    <a:bodyPr/>
-                    <a:lstStyle/>
-                    <a:p>
-                      <a:pPr marL="0" marR="0">
-                        <a:lnSpc>
-                          <a:spcPct val="115000"/>
-                        </a:lnSpc>
-                        <a:spcBef>
-                          <a:spcPts val="0"/>
-                        </a:spcBef>
-                        <a:spcAft>
-                          <a:spcPts val="0"/>
-                        </a:spcAft>
-                      </a:pPr>
-                      <a:r>
-                        <a:rPr lang="en-US" sz="2400">
-                          <a:effectLst/>
-                        </a:rPr>
-                        <a:t>Cost</a:t>
-                      </a:r>
-                      <a:endParaRPr lang="en-US" sz="2400">
-                        <a:effectLst/>
-                        <a:latin typeface="Calibri" panose="020F0502020204030204" pitchFamily="34" charset="0"/>
-                        <a:ea typeface="Calibri" panose="020F0502020204030204" pitchFamily="34" charset="0"/>
-                        <a:cs typeface="Times New Roman" panose="02020603050405020304" pitchFamily="18" charset="0"/>
-                      </a:endParaRPr>
-                    </a:p>
-                  </a:txBody>
-                  <a:tcPr marL="68580" marR="68580" marT="0" marB="0"/>
-                </a:tc>
-              </a:tr>
-              <a:tr h="756792">
-                <a:tc>
-                  <a:txBody>
-                    <a:bodyPr/>
-                    <a:lstStyle/>
-                    <a:p>
-                      <a:pPr marL="0" marR="0">
-                        <a:lnSpc>
-                          <a:spcPct val="115000"/>
-                        </a:lnSpc>
-                        <a:spcBef>
-                          <a:spcPts val="0"/>
-                        </a:spcBef>
-                        <a:spcAft>
-                          <a:spcPts val="0"/>
-                        </a:spcAft>
-                      </a:pPr>
-                      <a:r>
-                        <a:rPr lang="en-US" sz="2400" dirty="0">
-                          <a:effectLst/>
-                        </a:rPr>
-                        <a:t>T-shirts</a:t>
-                      </a:r>
-                      <a:endParaRPr lang="en-US" sz="2400" dirty="0">
-                        <a:effectLst/>
-                        <a:latin typeface="Calibri" panose="020F0502020204030204" pitchFamily="34" charset="0"/>
-                        <a:ea typeface="Calibri" panose="020F0502020204030204" pitchFamily="34" charset="0"/>
-                        <a:cs typeface="Times New Roman" panose="02020603050405020304" pitchFamily="18" charset="0"/>
-                      </a:endParaRPr>
-                    </a:p>
-                  </a:txBody>
-                  <a:tcPr marL="68580" marR="68580" marT="0" marB="0"/>
-                </a:tc>
-                <a:tc>
-                  <a:txBody>
-                    <a:bodyPr/>
-                    <a:lstStyle/>
-                    <a:p>
-                      <a:pPr marL="0" marR="0">
-                        <a:lnSpc>
-                          <a:spcPct val="115000"/>
-                        </a:lnSpc>
-                        <a:spcBef>
-                          <a:spcPts val="0"/>
-                        </a:spcBef>
-                        <a:spcAft>
-                          <a:spcPts val="0"/>
-                        </a:spcAft>
-                      </a:pPr>
-                      <a:r>
-                        <a:rPr lang="en-US" sz="2400">
-                          <a:effectLst/>
-                        </a:rPr>
-                        <a:t>$442.20</a:t>
-                      </a:r>
-                      <a:endParaRPr lang="en-US" sz="2400">
-                        <a:effectLst/>
-                        <a:latin typeface="Calibri" panose="020F0502020204030204" pitchFamily="34" charset="0"/>
-                        <a:ea typeface="Calibri" panose="020F0502020204030204" pitchFamily="34" charset="0"/>
-                        <a:cs typeface="Times New Roman" panose="02020603050405020304" pitchFamily="18" charset="0"/>
-                      </a:endParaRPr>
-                    </a:p>
-                  </a:txBody>
-                  <a:tcPr marL="68580" marR="68580" marT="0" marB="0"/>
-                </a:tc>
-              </a:tr>
-              <a:tr h="756792">
-                <a:tc>
-                  <a:txBody>
-                    <a:bodyPr/>
-                    <a:lstStyle/>
-                    <a:p>
-                      <a:pPr marL="0" marR="0">
-                        <a:lnSpc>
-                          <a:spcPct val="115000"/>
-                        </a:lnSpc>
-                        <a:spcBef>
-                          <a:spcPts val="0"/>
-                        </a:spcBef>
-                        <a:spcAft>
-                          <a:spcPts val="0"/>
-                        </a:spcAft>
-                      </a:pPr>
-                      <a:r>
-                        <a:rPr lang="en-US" sz="2400" dirty="0">
-                          <a:effectLst/>
-                        </a:rPr>
-                        <a:t>Convention</a:t>
-                      </a:r>
-                      <a:endParaRPr lang="en-US" sz="2400" dirty="0">
-                        <a:effectLst/>
-                        <a:latin typeface="Calibri" panose="020F0502020204030204" pitchFamily="34" charset="0"/>
-                        <a:ea typeface="Calibri" panose="020F0502020204030204" pitchFamily="34" charset="0"/>
-                        <a:cs typeface="Times New Roman" panose="02020603050405020304" pitchFamily="18" charset="0"/>
-                      </a:endParaRPr>
-                    </a:p>
-                  </a:txBody>
-                  <a:tcPr marL="68580" marR="68580" marT="0" marB="0"/>
-                </a:tc>
-                <a:tc>
-                  <a:txBody>
-                    <a:bodyPr/>
-                    <a:lstStyle/>
-                    <a:p>
-                      <a:pPr marL="0" marR="0">
-                        <a:lnSpc>
-                          <a:spcPct val="115000"/>
-                        </a:lnSpc>
-                        <a:spcBef>
-                          <a:spcPts val="0"/>
-                        </a:spcBef>
-                        <a:spcAft>
-                          <a:spcPts val="0"/>
-                        </a:spcAft>
-                      </a:pPr>
-                      <a:r>
-                        <a:rPr lang="en-US" sz="2400" dirty="0">
-                          <a:effectLst/>
-                        </a:rPr>
-                        <a:t>$6,600</a:t>
-                      </a:r>
-                      <a:endParaRPr lang="en-US" sz="2400" dirty="0">
-                        <a:effectLst/>
-                        <a:latin typeface="Calibri" panose="020F0502020204030204" pitchFamily="34" charset="0"/>
-                        <a:ea typeface="Calibri" panose="020F0502020204030204" pitchFamily="34" charset="0"/>
-                        <a:cs typeface="Times New Roman" panose="02020603050405020304" pitchFamily="18" charset="0"/>
-                      </a:endParaRPr>
-                    </a:p>
-                  </a:txBody>
-                  <a:tcPr marL="68580" marR="68580" marT="0" marB="0"/>
-                </a:tc>
-              </a:tr>
-              <a:tr h="756792">
-                <a:tc>
-                  <a:txBody>
-                    <a:bodyPr/>
-                    <a:lstStyle/>
-                    <a:p>
-                      <a:pPr marL="0" marR="0">
-                        <a:lnSpc>
-                          <a:spcPct val="115000"/>
-                        </a:lnSpc>
-                        <a:spcBef>
-                          <a:spcPts val="0"/>
-                        </a:spcBef>
-                        <a:spcAft>
-                          <a:spcPts val="0"/>
-                        </a:spcAft>
-                      </a:pPr>
-                      <a:r>
-                        <a:rPr lang="en-US" sz="2400">
-                          <a:effectLst/>
-                        </a:rPr>
-                        <a:t>Web Advertising</a:t>
-                      </a:r>
-                      <a:endParaRPr lang="en-US" sz="2400">
-                        <a:effectLst/>
-                        <a:latin typeface="Calibri" panose="020F0502020204030204" pitchFamily="34" charset="0"/>
-                        <a:ea typeface="Calibri" panose="020F0502020204030204" pitchFamily="34" charset="0"/>
-                        <a:cs typeface="Times New Roman" panose="02020603050405020304" pitchFamily="18" charset="0"/>
-                      </a:endParaRPr>
-                    </a:p>
-                  </a:txBody>
-                  <a:tcPr marL="68580" marR="68580" marT="0" marB="0"/>
-                </a:tc>
-                <a:tc>
-                  <a:txBody>
-                    <a:bodyPr/>
-                    <a:lstStyle/>
-                    <a:p>
-                      <a:pPr marL="0" marR="0">
-                        <a:lnSpc>
-                          <a:spcPct val="115000"/>
-                        </a:lnSpc>
-                        <a:spcBef>
-                          <a:spcPts val="0"/>
-                        </a:spcBef>
-                        <a:spcAft>
-                          <a:spcPts val="0"/>
-                        </a:spcAft>
-                      </a:pPr>
-                      <a:r>
-                        <a:rPr lang="en-US" sz="2400" dirty="0">
-                          <a:effectLst/>
-                        </a:rPr>
-                        <a:t>$100,000</a:t>
-                      </a:r>
-                      <a:endParaRPr lang="en-US" sz="2400" dirty="0">
-                        <a:effectLst/>
-                        <a:latin typeface="Calibri" panose="020F0502020204030204" pitchFamily="34" charset="0"/>
-                        <a:ea typeface="Calibri" panose="020F0502020204030204" pitchFamily="34" charset="0"/>
-                        <a:cs typeface="Times New Roman" panose="02020603050405020304" pitchFamily="18" charset="0"/>
-                      </a:endParaRPr>
-                    </a:p>
-                  </a:txBody>
-                  <a:tcPr marL="68580" marR="68580" marT="0" marB="0"/>
-                </a:tc>
-              </a:tr>
-              <a:tr h="756792">
-                <a:tc>
-                  <a:txBody>
-                    <a:bodyPr/>
-                    <a:lstStyle/>
-                    <a:p>
-                      <a:pPr marL="0" marR="0">
-                        <a:lnSpc>
-                          <a:spcPct val="115000"/>
-                        </a:lnSpc>
-                        <a:spcBef>
-                          <a:spcPts val="0"/>
-                        </a:spcBef>
-                        <a:spcAft>
-                          <a:spcPts val="0"/>
-                        </a:spcAft>
-                      </a:pPr>
-                      <a:r>
-                        <a:rPr lang="en-US" sz="2400">
-                          <a:effectLst/>
-                        </a:rPr>
-                        <a:t>Advertising Banner</a:t>
-                      </a:r>
-                      <a:endParaRPr lang="en-US" sz="2400">
-                        <a:effectLst/>
-                        <a:latin typeface="Calibri" panose="020F0502020204030204" pitchFamily="34" charset="0"/>
-                        <a:ea typeface="Calibri" panose="020F0502020204030204" pitchFamily="34" charset="0"/>
-                        <a:cs typeface="Times New Roman" panose="02020603050405020304" pitchFamily="18" charset="0"/>
-                      </a:endParaRPr>
-                    </a:p>
-                  </a:txBody>
-                  <a:tcPr marL="68580" marR="68580" marT="0" marB="0"/>
-                </a:tc>
-                <a:tc>
-                  <a:txBody>
-                    <a:bodyPr/>
-                    <a:lstStyle/>
-                    <a:p>
-                      <a:pPr marL="0" marR="0">
-                        <a:lnSpc>
-                          <a:spcPct val="115000"/>
-                        </a:lnSpc>
-                        <a:spcBef>
-                          <a:spcPts val="0"/>
-                        </a:spcBef>
-                        <a:spcAft>
-                          <a:spcPts val="0"/>
-                        </a:spcAft>
-                      </a:pPr>
-                      <a:r>
-                        <a:rPr lang="en-US" sz="2400" dirty="0">
-                          <a:effectLst/>
-                        </a:rPr>
-                        <a:t>$79.00</a:t>
-                      </a:r>
-                      <a:endParaRPr lang="en-US" sz="2400" dirty="0">
-                        <a:effectLst/>
-                        <a:latin typeface="Calibri" panose="020F0502020204030204" pitchFamily="34" charset="0"/>
-                        <a:ea typeface="Calibri" panose="020F0502020204030204" pitchFamily="34" charset="0"/>
-                        <a:cs typeface="Times New Roman" panose="02020603050405020304" pitchFamily="18" charset="0"/>
-                      </a:endParaRPr>
-                    </a:p>
-                  </a:txBody>
-                  <a:tcPr marL="68580" marR="68580" marT="0" marB="0"/>
-                </a:tc>
-              </a:tr>
-              <a:tr h="756792">
-                <a:tc>
-                  <a:txBody>
-                    <a:bodyPr/>
-                    <a:lstStyle/>
-                    <a:p>
-                      <a:pPr marL="0" marR="0">
-                        <a:lnSpc>
-                          <a:spcPct val="115000"/>
-                        </a:lnSpc>
-                        <a:spcBef>
-                          <a:spcPts val="0"/>
-                        </a:spcBef>
-                        <a:spcAft>
-                          <a:spcPts val="0"/>
-                        </a:spcAft>
-                      </a:pPr>
-                      <a:r>
-                        <a:rPr lang="en-US" sz="2400">
-                          <a:effectLst/>
-                        </a:rPr>
-                        <a:t>Totals </a:t>
-                      </a:r>
-                      <a:endParaRPr lang="en-US" sz="2400">
-                        <a:effectLst/>
-                        <a:latin typeface="Calibri" panose="020F0502020204030204" pitchFamily="34" charset="0"/>
-                        <a:ea typeface="Calibri" panose="020F0502020204030204" pitchFamily="34" charset="0"/>
-                        <a:cs typeface="Times New Roman" panose="02020603050405020304" pitchFamily="18" charset="0"/>
-                      </a:endParaRPr>
-                    </a:p>
-                  </a:txBody>
-                  <a:tcPr marL="68580" marR="68580" marT="0" marB="0"/>
-                </a:tc>
-                <a:tc>
-                  <a:txBody>
-                    <a:bodyPr/>
-                    <a:lstStyle/>
-                    <a:p>
-                      <a:pPr marL="0" marR="0">
-                        <a:lnSpc>
-                          <a:spcPct val="115000"/>
-                        </a:lnSpc>
-                        <a:spcBef>
-                          <a:spcPts val="0"/>
-                        </a:spcBef>
-                        <a:spcAft>
-                          <a:spcPts val="0"/>
-                        </a:spcAft>
-                      </a:pPr>
-                      <a:r>
-                        <a:rPr lang="en-US" sz="2400" dirty="0">
-                          <a:effectLst/>
-                        </a:rPr>
-                        <a:t>$107,121</a:t>
-                      </a:r>
-                      <a:endParaRPr lang="en-US" sz="2400" dirty="0">
-                        <a:effectLst/>
-                        <a:latin typeface="Calibri" panose="020F0502020204030204" pitchFamily="34" charset="0"/>
-                        <a:ea typeface="Calibri" panose="020F0502020204030204" pitchFamily="34" charset="0"/>
-                        <a:cs typeface="Times New Roman" panose="02020603050405020304" pitchFamily="18" charset="0"/>
-                      </a:endParaRPr>
-                    </a:p>
-                  </a:txBody>
-                  <a:tcPr marL="68580" marR="68580" marT="0" marB="0"/>
-                </a:tc>
-              </a:tr>
-            </a:tbl>
-          </a:graphicData>
-        </a:graphic>
-      </p:graphicFrame>
-    </p:spTree>
-    <p:extLst>
-      <p:ext uri="{BB962C8B-B14F-4D97-AF65-F5344CB8AC3E}">
-        <p14:creationId xmlns:p14="http://schemas.microsoft.com/office/powerpoint/2010/main" val="960174548"/>
-      </p:ext>
-    </p:extLst>
-  </p:cSld>
-  <p:clrMapOvr>
-    <a:masterClrMapping/>
-  </p:clrMapOvr>
-  <p:timing>
-    <p:tnLst>
-      <p:par>
-        <p:cTn id="1" dur="indefinite" restart="never" nodeType="tmRoot"/>
-      </p:par>
-    </p:tnLst>
-  </p:timing>
-</p:sld>
-</file>
-
-<file path=ppt/slides/slide7.xml><?xml version="1.0" encoding="utf-8"?>
+<file path=ppt/slides/slide10.xml><?xml version="1.0" encoding="utf-8"?>
 <p:sld xmlns:a="http://schemas.openxmlformats.org/drawingml/2006/main" xmlns:r="http://schemas.openxmlformats.org/officeDocument/2006/relationships" xmlns:p="http://schemas.openxmlformats.org/presentationml/2006/main">
   <p:cSld>
     <p:spTree>
@@ -9070,7 +7512,7 @@
 </p:sld>
 </file>
 
-<file path=ppt/slides/slide8.xml><?xml version="1.0" encoding="utf-8"?>
+<file path=ppt/slides/slide11.xml><?xml version="1.0" encoding="utf-8"?>
 <p:sld xmlns:a="http://schemas.openxmlformats.org/drawingml/2006/main" xmlns:r="http://schemas.openxmlformats.org/officeDocument/2006/relationships" xmlns:p="http://schemas.openxmlformats.org/presentationml/2006/main">
   <p:cSld>
     <p:spTree>
@@ -9555,7 +7997,7 @@
 </p:sld>
 </file>
 
-<file path=ppt/slides/slide9.xml><?xml version="1.0" encoding="utf-8"?>
+<file path=ppt/slides/slide12.xml><?xml version="1.0" encoding="utf-8"?>
 <p:sld xmlns:a="http://schemas.openxmlformats.org/drawingml/2006/main" xmlns:r="http://schemas.openxmlformats.org/officeDocument/2006/relationships" xmlns:p="http://schemas.openxmlformats.org/presentationml/2006/main">
   <p:cSld>
     <p:spTree>
@@ -10866,6 +9308,2057 @@
 </p:sld>
 </file>
 
+<file path=ppt/slides/slide2.xml><?xml version="1.0" encoding="utf-8"?>
+<p:sld xmlns:a="http://schemas.openxmlformats.org/drawingml/2006/main" xmlns:r="http://schemas.openxmlformats.org/officeDocument/2006/relationships" xmlns:p="http://schemas.openxmlformats.org/presentationml/2006/main">
+  <p:cSld>
+    <p:spTree>
+      <p:nvGrpSpPr>
+        <p:cNvPr id="1" name=""/>
+        <p:cNvGrpSpPr/>
+        <p:nvPr/>
+      </p:nvGrpSpPr>
+      <p:grpSpPr>
+        <a:xfrm>
+          <a:off x="0" y="0"/>
+          <a:ext cx="0" cy="0"/>
+          <a:chOff x="0" y="0"/>
+          <a:chExt cx="0" cy="0"/>
+        </a:xfrm>
+      </p:grpSpPr>
+      <p:sp>
+        <p:nvSpPr>
+          <p:cNvPr id="10" name="TextBox 9"/>
+          <p:cNvSpPr txBox="1"/>
+          <p:nvPr/>
+        </p:nvSpPr>
+        <p:spPr>
+          <a:xfrm>
+            <a:off x="3640348" y="724619"/>
+            <a:ext cx="5589917" cy="523220"/>
+          </a:xfrm>
+          <a:prstGeom prst="rect">
+            <a:avLst/>
+          </a:prstGeom>
+          <a:noFill/>
+        </p:spPr>
+        <p:txBody>
+          <a:bodyPr wrap="square" rtlCol="0">
+            <a:spAutoFit/>
+          </a:bodyPr>
+          <a:lstStyle/>
+          <a:p>
+            <a:r>
+              <a:rPr lang="en-US" sz="2800" b="1" dirty="0" smtClean="0"/>
+              <a:t>Product Demo</a:t>
+            </a:r>
+            <a:endParaRPr lang="en-US" sz="2800" b="1" dirty="0"/>
+          </a:p>
+        </p:txBody>
+      </p:sp>
+      <p:sp>
+        <p:nvSpPr>
+          <p:cNvPr id="11" name="TextBox 10"/>
+          <p:cNvSpPr txBox="1"/>
+          <p:nvPr/>
+        </p:nvSpPr>
+        <p:spPr>
+          <a:xfrm>
+            <a:off x="3640348" y="1247839"/>
+            <a:ext cx="5589917" cy="6124754"/>
+          </a:xfrm>
+          <a:prstGeom prst="rect">
+            <a:avLst/>
+          </a:prstGeom>
+          <a:noFill/>
+        </p:spPr>
+        <p:txBody>
+          <a:bodyPr wrap="square" rtlCol="0">
+            <a:spAutoFit/>
+          </a:bodyPr>
+          <a:lstStyle/>
+          <a:p>
+            <a:pPr marL="457200" indent="-457200">
+              <a:buClr>
+                <a:srgbClr val="0070C0"/>
+              </a:buClr>
+              <a:buFont typeface="Wingdings" panose="05000000000000000000" pitchFamily="2" charset="2"/>
+              <a:buChar char="Ø"/>
+            </a:pPr>
+            <a:r>
+              <a:rPr lang="en-US" sz="2800" dirty="0"/>
+              <a:t>Users</a:t>
+            </a:r>
+          </a:p>
+          <a:p>
+            <a:pPr marL="914400" lvl="1" indent="-457200">
+              <a:buClr>
+                <a:srgbClr val="0070C0"/>
+              </a:buClr>
+              <a:buFont typeface="Wingdings" panose="05000000000000000000" pitchFamily="2" charset="2"/>
+              <a:buChar char="Ø"/>
+            </a:pPr>
+            <a:r>
+              <a:rPr lang="en-US" sz="2800" dirty="0"/>
+              <a:t>Login/Create User</a:t>
+            </a:r>
+          </a:p>
+          <a:p>
+            <a:pPr marL="914400" lvl="1" indent="-457200">
+              <a:buClr>
+                <a:srgbClr val="0070C0"/>
+              </a:buClr>
+              <a:buFont typeface="Wingdings" panose="05000000000000000000" pitchFamily="2" charset="2"/>
+              <a:buChar char="Ø"/>
+            </a:pPr>
+            <a:r>
+              <a:rPr lang="en-US" sz="2800" dirty="0"/>
+              <a:t>Display Interface/User Info</a:t>
+            </a:r>
+          </a:p>
+          <a:p>
+            <a:pPr marL="914400" lvl="1" indent="-457200">
+              <a:buClr>
+                <a:srgbClr val="0070C0"/>
+              </a:buClr>
+              <a:buFont typeface="Wingdings" panose="05000000000000000000" pitchFamily="2" charset="2"/>
+              <a:buChar char="Ø"/>
+            </a:pPr>
+            <a:r>
+              <a:rPr lang="en-US" sz="2800" dirty="0"/>
+              <a:t>About/Contact</a:t>
+            </a:r>
+          </a:p>
+          <a:p>
+            <a:pPr marL="457200" indent="-457200">
+              <a:buClr>
+                <a:srgbClr val="0070C0"/>
+              </a:buClr>
+              <a:buFont typeface="Wingdings" panose="05000000000000000000" pitchFamily="2" charset="2"/>
+              <a:buChar char="Ø"/>
+            </a:pPr>
+            <a:r>
+              <a:rPr lang="en-US" sz="2800" dirty="0"/>
+              <a:t>Groups</a:t>
+            </a:r>
+          </a:p>
+          <a:p>
+            <a:pPr marL="914400" lvl="1" indent="-457200">
+              <a:buClr>
+                <a:srgbClr val="0070C0"/>
+              </a:buClr>
+              <a:buFont typeface="Wingdings" panose="05000000000000000000" pitchFamily="2" charset="2"/>
+              <a:buChar char="Ø"/>
+            </a:pPr>
+            <a:r>
+              <a:rPr lang="en-US" sz="2800" dirty="0"/>
+              <a:t>Add Group</a:t>
+            </a:r>
+          </a:p>
+          <a:p>
+            <a:pPr marL="914400" lvl="1" indent="-457200">
+              <a:buClr>
+                <a:srgbClr val="0070C0"/>
+              </a:buClr>
+              <a:buFont typeface="Wingdings" panose="05000000000000000000" pitchFamily="2" charset="2"/>
+              <a:buChar char="Ø"/>
+            </a:pPr>
+            <a:r>
+              <a:rPr lang="en-US" sz="2800" dirty="0"/>
+              <a:t>View Group</a:t>
+            </a:r>
+          </a:p>
+          <a:p>
+            <a:pPr marL="914400" lvl="1" indent="-457200">
+              <a:buClr>
+                <a:srgbClr val="0070C0"/>
+              </a:buClr>
+              <a:buFont typeface="Wingdings" panose="05000000000000000000" pitchFamily="2" charset="2"/>
+              <a:buChar char="Ø"/>
+            </a:pPr>
+            <a:r>
+              <a:rPr lang="en-US" sz="2800" dirty="0"/>
+              <a:t>Add Members</a:t>
+            </a:r>
+          </a:p>
+          <a:p>
+            <a:pPr marL="914400" lvl="1" indent="-457200">
+              <a:buClr>
+                <a:srgbClr val="0070C0"/>
+              </a:buClr>
+              <a:buFont typeface="Wingdings" panose="05000000000000000000" pitchFamily="2" charset="2"/>
+              <a:buChar char="Ø"/>
+            </a:pPr>
+            <a:r>
+              <a:rPr lang="en-US" sz="2800" dirty="0"/>
+              <a:t>Join Group</a:t>
+            </a:r>
+          </a:p>
+          <a:p>
+            <a:pPr marL="457200" indent="-457200">
+              <a:buClr>
+                <a:srgbClr val="0070C0"/>
+              </a:buClr>
+              <a:buFont typeface="Wingdings" panose="05000000000000000000" pitchFamily="2" charset="2"/>
+              <a:buChar char="Ø"/>
+            </a:pPr>
+            <a:r>
+              <a:rPr lang="en-US" sz="2800" dirty="0"/>
+              <a:t>Messaging</a:t>
+            </a:r>
+          </a:p>
+          <a:p>
+            <a:pPr marL="914400" lvl="1" indent="-457200">
+              <a:buClr>
+                <a:srgbClr val="0070C0"/>
+              </a:buClr>
+              <a:buFont typeface="Wingdings" panose="05000000000000000000" pitchFamily="2" charset="2"/>
+              <a:buChar char="Ø"/>
+            </a:pPr>
+            <a:r>
+              <a:rPr lang="en-US" sz="2800" dirty="0"/>
+              <a:t>Send message</a:t>
+            </a:r>
+          </a:p>
+          <a:p>
+            <a:pPr marL="914400" lvl="1" indent="-457200">
+              <a:buClr>
+                <a:srgbClr val="0070C0"/>
+              </a:buClr>
+              <a:buFont typeface="Wingdings" panose="05000000000000000000" pitchFamily="2" charset="2"/>
+              <a:buChar char="Ø"/>
+            </a:pPr>
+            <a:r>
+              <a:rPr lang="en-US" sz="2800" dirty="0"/>
+              <a:t>View Message</a:t>
+            </a:r>
+          </a:p>
+          <a:p>
+            <a:pPr marL="914400" lvl="1" indent="-457200">
+              <a:buClr>
+                <a:srgbClr val="0070C0"/>
+              </a:buClr>
+              <a:buFont typeface="Wingdings" panose="05000000000000000000" pitchFamily="2" charset="2"/>
+              <a:buChar char="Ø"/>
+            </a:pPr>
+            <a:r>
+              <a:rPr lang="en-US" sz="2800" dirty="0"/>
+              <a:t>Inbox Icon</a:t>
+            </a:r>
+          </a:p>
+          <a:p>
+            <a:pPr marL="914400" lvl="1" indent="-457200">
+              <a:buFont typeface="Wingdings" panose="05000000000000000000" pitchFamily="2" charset="2"/>
+              <a:buChar char="Ø"/>
+            </a:pPr>
+            <a:endParaRPr lang="en-US" sz="2800" dirty="0" smtClean="0"/>
+          </a:p>
+        </p:txBody>
+      </p:sp>
+      <p:pic>
+        <p:nvPicPr>
+          <p:cNvPr id="9" name="Picture 8"/>
+          <p:cNvPicPr>
+            <a:picLocks noChangeAspect="1"/>
+          </p:cNvPicPr>
+          <p:nvPr/>
+        </p:nvPicPr>
+        <p:blipFill>
+          <a:blip r:embed="rId2">
+            <a:extLst>
+              <a:ext uri="{28A0092B-C50C-407E-A947-70E740481C1C}">
+                <a14:useLocalDpi xmlns:a14="http://schemas.microsoft.com/office/drawing/2010/main" val="0"/>
+              </a:ext>
+            </a:extLst>
+          </a:blip>
+          <a:stretch>
+            <a:fillRect/>
+          </a:stretch>
+        </p:blipFill>
+        <p:spPr>
+          <a:xfrm>
+            <a:off x="195355" y="1023586"/>
+            <a:ext cx="3054647" cy="2499257"/>
+          </a:xfrm>
+          <a:prstGeom prst="rect">
+            <a:avLst/>
+          </a:prstGeom>
+        </p:spPr>
+      </p:pic>
+    </p:spTree>
+    <p:extLst>
+      <p:ext uri="{BB962C8B-B14F-4D97-AF65-F5344CB8AC3E}">
+        <p14:creationId xmlns:p14="http://schemas.microsoft.com/office/powerpoint/2010/main" val="827005068"/>
+      </p:ext>
+    </p:extLst>
+  </p:cSld>
+  <p:clrMapOvr>
+    <a:masterClrMapping/>
+  </p:clrMapOvr>
+  <p:timing>
+    <p:tnLst>
+      <p:par>
+        <p:cTn id="1" dur="indefinite" restart="never" nodeType="tmRoot"/>
+      </p:par>
+    </p:tnLst>
+  </p:timing>
+</p:sld>
+</file>
+
+<file path=ppt/slides/slide3.xml><?xml version="1.0" encoding="utf-8"?>
+<p:sld xmlns:a="http://schemas.openxmlformats.org/drawingml/2006/main" xmlns:r="http://schemas.openxmlformats.org/officeDocument/2006/relationships" xmlns:p="http://schemas.openxmlformats.org/presentationml/2006/main">
+  <p:cSld>
+    <p:spTree>
+      <p:nvGrpSpPr>
+        <p:cNvPr id="1" name=""/>
+        <p:cNvGrpSpPr/>
+        <p:nvPr/>
+      </p:nvGrpSpPr>
+      <p:grpSpPr>
+        <a:xfrm>
+          <a:off x="0" y="0"/>
+          <a:ext cx="0" cy="0"/>
+          <a:chOff x="0" y="0"/>
+          <a:chExt cx="0" cy="0"/>
+        </a:xfrm>
+      </p:grpSpPr>
+      <p:sp>
+        <p:nvSpPr>
+          <p:cNvPr id="10" name="TextBox 9"/>
+          <p:cNvSpPr txBox="1"/>
+          <p:nvPr/>
+        </p:nvSpPr>
+        <p:spPr>
+          <a:xfrm>
+            <a:off x="3640348" y="724619"/>
+            <a:ext cx="5589917" cy="523220"/>
+          </a:xfrm>
+          <a:prstGeom prst="rect">
+            <a:avLst/>
+          </a:prstGeom>
+          <a:noFill/>
+        </p:spPr>
+        <p:txBody>
+          <a:bodyPr wrap="square" rtlCol="0">
+            <a:spAutoFit/>
+          </a:bodyPr>
+          <a:lstStyle/>
+          <a:p>
+            <a:r>
+              <a:rPr lang="en-US" sz="2800" b="1" dirty="0" smtClean="0"/>
+              <a:t>Product Demo</a:t>
+            </a:r>
+            <a:endParaRPr lang="en-US" sz="2800" b="1" dirty="0"/>
+          </a:p>
+        </p:txBody>
+      </p:sp>
+      <p:sp>
+        <p:nvSpPr>
+          <p:cNvPr id="11" name="TextBox 10"/>
+          <p:cNvSpPr txBox="1"/>
+          <p:nvPr/>
+        </p:nvSpPr>
+        <p:spPr>
+          <a:xfrm>
+            <a:off x="3640348" y="1401279"/>
+            <a:ext cx="5589917" cy="6555641"/>
+          </a:xfrm>
+          <a:prstGeom prst="rect">
+            <a:avLst/>
+          </a:prstGeom>
+          <a:noFill/>
+        </p:spPr>
+        <p:txBody>
+          <a:bodyPr wrap="square" rtlCol="0">
+            <a:spAutoFit/>
+          </a:bodyPr>
+          <a:lstStyle/>
+          <a:p>
+            <a:pPr marL="457200" indent="-457200">
+              <a:buClr>
+                <a:srgbClr val="0070C0"/>
+              </a:buClr>
+              <a:buFont typeface="Wingdings" panose="05000000000000000000" pitchFamily="2" charset="2"/>
+              <a:buChar char="Ø"/>
+            </a:pPr>
+            <a:r>
+              <a:rPr lang="en-US" sz="2800" dirty="0"/>
+              <a:t>Routine</a:t>
+            </a:r>
+          </a:p>
+          <a:p>
+            <a:pPr marL="914400" lvl="1" indent="-457200">
+              <a:buClr>
+                <a:srgbClr val="0070C0"/>
+              </a:buClr>
+              <a:buFont typeface="Wingdings" panose="05000000000000000000" pitchFamily="2" charset="2"/>
+              <a:buChar char="Ø"/>
+            </a:pPr>
+            <a:r>
+              <a:rPr lang="en-US" sz="2800" dirty="0"/>
+              <a:t>Create Routine</a:t>
+            </a:r>
+          </a:p>
+          <a:p>
+            <a:pPr marL="1371600" lvl="2" indent="-457200">
+              <a:buClr>
+                <a:srgbClr val="0070C0"/>
+              </a:buClr>
+              <a:buFont typeface="Wingdings" panose="05000000000000000000" pitchFamily="2" charset="2"/>
+              <a:buChar char="Ø"/>
+            </a:pPr>
+            <a:r>
+              <a:rPr lang="en-US" sz="2800" dirty="0"/>
+              <a:t>Add Exercise</a:t>
+            </a:r>
+          </a:p>
+          <a:p>
+            <a:pPr marL="914400" lvl="1" indent="-457200">
+              <a:buClr>
+                <a:srgbClr val="0070C0"/>
+              </a:buClr>
+              <a:buFont typeface="Wingdings" panose="05000000000000000000" pitchFamily="2" charset="2"/>
+              <a:buChar char="Ø"/>
+            </a:pPr>
+            <a:r>
+              <a:rPr lang="en-US" sz="2800" dirty="0"/>
+              <a:t>View Routine Info Page</a:t>
+            </a:r>
+          </a:p>
+          <a:p>
+            <a:pPr marL="914400" lvl="1" indent="-457200">
+              <a:buClr>
+                <a:srgbClr val="0070C0"/>
+              </a:buClr>
+              <a:buFont typeface="Wingdings" panose="05000000000000000000" pitchFamily="2" charset="2"/>
+              <a:buChar char="Ø"/>
+            </a:pPr>
+            <a:r>
+              <a:rPr lang="en-US" sz="2800" dirty="0"/>
+              <a:t>Edit Routine</a:t>
+            </a:r>
+          </a:p>
+          <a:p>
+            <a:pPr marL="457200" indent="-457200">
+              <a:buClr>
+                <a:srgbClr val="0070C0"/>
+              </a:buClr>
+              <a:buFont typeface="Wingdings" panose="05000000000000000000" pitchFamily="2" charset="2"/>
+              <a:buChar char="Ø"/>
+            </a:pPr>
+            <a:r>
+              <a:rPr lang="en-US" sz="2800" dirty="0"/>
+              <a:t>Exercises</a:t>
+            </a:r>
+          </a:p>
+          <a:p>
+            <a:pPr marL="914400" lvl="1" indent="-457200">
+              <a:buClr>
+                <a:srgbClr val="0070C0"/>
+              </a:buClr>
+              <a:buFont typeface="Wingdings" panose="05000000000000000000" pitchFamily="2" charset="2"/>
+              <a:buChar char="Ø"/>
+            </a:pPr>
+            <a:r>
+              <a:rPr lang="en-US" sz="2800" dirty="0"/>
+              <a:t>View Exercise Info Page</a:t>
+            </a:r>
+          </a:p>
+          <a:p>
+            <a:pPr marL="914400" lvl="1" indent="-457200">
+              <a:buClr>
+                <a:srgbClr val="0070C0"/>
+              </a:buClr>
+              <a:buFont typeface="Wingdings" panose="05000000000000000000" pitchFamily="2" charset="2"/>
+              <a:buChar char="Ø"/>
+            </a:pPr>
+            <a:r>
+              <a:rPr lang="en-US" sz="2800" dirty="0"/>
+              <a:t>Edit Exercise</a:t>
+            </a:r>
+          </a:p>
+          <a:p>
+            <a:pPr marL="457200" indent="-457200">
+              <a:buClr>
+                <a:srgbClr val="0070C0"/>
+              </a:buClr>
+              <a:buFont typeface="Wingdings" panose="05000000000000000000" pitchFamily="2" charset="2"/>
+              <a:buChar char="Ø"/>
+            </a:pPr>
+            <a:r>
+              <a:rPr lang="en-US" sz="2800" dirty="0"/>
+              <a:t>Log</a:t>
+            </a:r>
+          </a:p>
+          <a:p>
+            <a:pPr marL="914400" lvl="1" indent="-457200">
+              <a:buClr>
+                <a:srgbClr val="0070C0"/>
+              </a:buClr>
+              <a:buFont typeface="Wingdings" panose="05000000000000000000" pitchFamily="2" charset="2"/>
+              <a:buChar char="Ø"/>
+            </a:pPr>
+            <a:r>
+              <a:rPr lang="en-US" sz="2800" dirty="0"/>
+              <a:t>Start Routine</a:t>
+            </a:r>
+          </a:p>
+          <a:p>
+            <a:pPr marL="914400" lvl="1" indent="-457200">
+              <a:buClr>
+                <a:srgbClr val="0070C0"/>
+              </a:buClr>
+              <a:buFont typeface="Wingdings" panose="05000000000000000000" pitchFamily="2" charset="2"/>
+              <a:buChar char="Ø"/>
+            </a:pPr>
+            <a:r>
+              <a:rPr lang="en-US" sz="2800" dirty="0"/>
+              <a:t>View Log/Explain Stats</a:t>
+            </a:r>
+          </a:p>
+          <a:p>
+            <a:pPr marL="914400" lvl="1" indent="-457200">
+              <a:buClr>
+                <a:srgbClr val="0070C0"/>
+              </a:buClr>
+              <a:buFont typeface="Wingdings" panose="05000000000000000000" pitchFamily="2" charset="2"/>
+              <a:buChar char="Ø"/>
+            </a:pPr>
+            <a:endParaRPr lang="en-US" sz="2800" dirty="0" smtClean="0"/>
+          </a:p>
+          <a:p>
+            <a:pPr marL="914400" lvl="1" indent="-457200">
+              <a:buClr>
+                <a:schemeClr val="accent1">
+                  <a:lumMod val="75000"/>
+                </a:schemeClr>
+              </a:buClr>
+              <a:buFont typeface="Wingdings" panose="05000000000000000000" pitchFamily="2" charset="2"/>
+              <a:buChar char="Ø"/>
+            </a:pPr>
+            <a:endParaRPr lang="en-US" sz="2800" dirty="0" smtClean="0"/>
+          </a:p>
+          <a:p>
+            <a:pPr marL="457200" indent="-457200">
+              <a:buFont typeface="Wingdings" panose="05000000000000000000" pitchFamily="2" charset="2"/>
+              <a:buChar char="Ø"/>
+            </a:pPr>
+            <a:endParaRPr lang="en-US" sz="2800" dirty="0" smtClean="0"/>
+          </a:p>
+          <a:p>
+            <a:pPr marL="914400" lvl="1" indent="-457200">
+              <a:buFont typeface="Wingdings" panose="05000000000000000000" pitchFamily="2" charset="2"/>
+              <a:buChar char="Ø"/>
+            </a:pPr>
+            <a:endParaRPr lang="en-US" sz="2800" dirty="0" smtClean="0"/>
+          </a:p>
+        </p:txBody>
+      </p:sp>
+      <p:pic>
+        <p:nvPicPr>
+          <p:cNvPr id="9" name="Picture 8"/>
+          <p:cNvPicPr>
+            <a:picLocks noChangeAspect="1"/>
+          </p:cNvPicPr>
+          <p:nvPr/>
+        </p:nvPicPr>
+        <p:blipFill>
+          <a:blip r:embed="rId2">
+            <a:extLst>
+              <a:ext uri="{28A0092B-C50C-407E-A947-70E740481C1C}">
+                <a14:useLocalDpi xmlns:a14="http://schemas.microsoft.com/office/drawing/2010/main" val="0"/>
+              </a:ext>
+            </a:extLst>
+          </a:blip>
+          <a:stretch>
+            <a:fillRect/>
+          </a:stretch>
+        </p:blipFill>
+        <p:spPr>
+          <a:xfrm>
+            <a:off x="195355" y="1023586"/>
+            <a:ext cx="3054647" cy="2499257"/>
+          </a:xfrm>
+          <a:prstGeom prst="rect">
+            <a:avLst/>
+          </a:prstGeom>
+        </p:spPr>
+      </p:pic>
+    </p:spTree>
+    <p:extLst>
+      <p:ext uri="{BB962C8B-B14F-4D97-AF65-F5344CB8AC3E}">
+        <p14:creationId xmlns:p14="http://schemas.microsoft.com/office/powerpoint/2010/main" val="2133008192"/>
+      </p:ext>
+    </p:extLst>
+  </p:cSld>
+  <p:clrMapOvr>
+    <a:masterClrMapping/>
+  </p:clrMapOvr>
+  <p:timing>
+    <p:tnLst>
+      <p:par>
+        <p:cTn id="1" dur="indefinite" restart="never" nodeType="tmRoot"/>
+      </p:par>
+    </p:tnLst>
+  </p:timing>
+</p:sld>
+</file>
+
+<file path=ppt/slides/slide4.xml><?xml version="1.0" encoding="utf-8"?>
+<p:sld xmlns:a="http://schemas.openxmlformats.org/drawingml/2006/main" xmlns:r="http://schemas.openxmlformats.org/officeDocument/2006/relationships" xmlns:p="http://schemas.openxmlformats.org/presentationml/2006/main">
+  <p:cSld>
+    <p:spTree>
+      <p:nvGrpSpPr>
+        <p:cNvPr id="1" name=""/>
+        <p:cNvGrpSpPr/>
+        <p:nvPr/>
+      </p:nvGrpSpPr>
+      <p:grpSpPr>
+        <a:xfrm>
+          <a:off x="0" y="0"/>
+          <a:ext cx="0" cy="0"/>
+          <a:chOff x="0" y="0"/>
+          <a:chExt cx="0" cy="0"/>
+        </a:xfrm>
+      </p:grpSpPr>
+      <p:sp>
+        <p:nvSpPr>
+          <p:cNvPr id="10" name="TextBox 9"/>
+          <p:cNvSpPr txBox="1"/>
+          <p:nvPr/>
+        </p:nvSpPr>
+        <p:spPr>
+          <a:xfrm>
+            <a:off x="3640348" y="724619"/>
+            <a:ext cx="5589917" cy="523220"/>
+          </a:xfrm>
+          <a:prstGeom prst="rect">
+            <a:avLst/>
+          </a:prstGeom>
+          <a:noFill/>
+        </p:spPr>
+        <p:txBody>
+          <a:bodyPr wrap="square" rtlCol="0">
+            <a:spAutoFit/>
+          </a:bodyPr>
+          <a:lstStyle/>
+          <a:p>
+            <a:r>
+              <a:rPr lang="en-US" sz="2800" b="1" dirty="0" smtClean="0"/>
+              <a:t>Product Demo</a:t>
+            </a:r>
+            <a:endParaRPr lang="en-US" sz="2800" b="1" dirty="0"/>
+          </a:p>
+        </p:txBody>
+      </p:sp>
+      <p:sp>
+        <p:nvSpPr>
+          <p:cNvPr id="11" name="TextBox 10"/>
+          <p:cNvSpPr txBox="1"/>
+          <p:nvPr/>
+        </p:nvSpPr>
+        <p:spPr>
+          <a:xfrm>
+            <a:off x="3640348" y="1401279"/>
+            <a:ext cx="5589917" cy="4832092"/>
+          </a:xfrm>
+          <a:prstGeom prst="rect">
+            <a:avLst/>
+          </a:prstGeom>
+          <a:noFill/>
+        </p:spPr>
+        <p:txBody>
+          <a:bodyPr wrap="square" rtlCol="0">
+            <a:spAutoFit/>
+          </a:bodyPr>
+          <a:lstStyle/>
+          <a:p>
+            <a:pPr marL="457200" indent="-457200">
+              <a:buClr>
+                <a:srgbClr val="0070C0"/>
+              </a:buClr>
+              <a:buFont typeface="Wingdings" panose="05000000000000000000" pitchFamily="2" charset="2"/>
+              <a:buChar char="Ø"/>
+            </a:pPr>
+            <a:r>
+              <a:rPr lang="en-US" sz="2800" dirty="0" smtClean="0"/>
+              <a:t>Calendar</a:t>
+            </a:r>
+          </a:p>
+          <a:p>
+            <a:pPr marL="914400" lvl="1" indent="-457200">
+              <a:buClr>
+                <a:srgbClr val="0070C0"/>
+              </a:buClr>
+              <a:buFont typeface="Wingdings" panose="05000000000000000000" pitchFamily="2" charset="2"/>
+              <a:buChar char="Ø"/>
+            </a:pPr>
+            <a:r>
+              <a:rPr lang="en-US" sz="2800" dirty="0" smtClean="0"/>
+              <a:t>Time Frame</a:t>
+            </a:r>
+          </a:p>
+          <a:p>
+            <a:pPr marL="914400" lvl="1" indent="-457200">
+              <a:buClr>
+                <a:srgbClr val="0070C0"/>
+              </a:buClr>
+              <a:buFont typeface="Wingdings" panose="05000000000000000000" pitchFamily="2" charset="2"/>
+              <a:buChar char="Ø"/>
+            </a:pPr>
+            <a:r>
+              <a:rPr lang="en-US" sz="2800" dirty="0" smtClean="0"/>
+              <a:t>Add Events</a:t>
+            </a:r>
+          </a:p>
+          <a:p>
+            <a:pPr marL="914400" lvl="1" indent="-457200">
+              <a:buClr>
+                <a:srgbClr val="0070C0"/>
+              </a:buClr>
+              <a:buFont typeface="Wingdings" panose="05000000000000000000" pitchFamily="2" charset="2"/>
+              <a:buChar char="Ø"/>
+            </a:pPr>
+            <a:r>
+              <a:rPr lang="en-US" sz="2800" dirty="0" smtClean="0"/>
+              <a:t>View Events</a:t>
+            </a:r>
+          </a:p>
+          <a:p>
+            <a:pPr marL="457200" indent="-457200">
+              <a:buClr>
+                <a:srgbClr val="0070C0"/>
+              </a:buClr>
+              <a:buFont typeface="Wingdings" panose="05000000000000000000" pitchFamily="2" charset="2"/>
+              <a:buChar char="Ø"/>
+            </a:pPr>
+            <a:r>
+              <a:rPr lang="en-US" sz="2800" dirty="0" smtClean="0"/>
+              <a:t>Challenges</a:t>
+            </a:r>
+          </a:p>
+          <a:p>
+            <a:pPr marL="914400" lvl="1" indent="-457200">
+              <a:buClr>
+                <a:srgbClr val="0070C0"/>
+              </a:buClr>
+              <a:buFont typeface="Wingdings" panose="05000000000000000000" pitchFamily="2" charset="2"/>
+              <a:buChar char="Ø"/>
+            </a:pPr>
+            <a:r>
+              <a:rPr lang="en-US" sz="2800" dirty="0" smtClean="0"/>
+              <a:t>Add Challenge</a:t>
+            </a:r>
+          </a:p>
+          <a:p>
+            <a:pPr marL="914400" lvl="1" indent="-457200">
+              <a:buClr>
+                <a:srgbClr val="0070C0"/>
+              </a:buClr>
+              <a:buFont typeface="Wingdings" panose="05000000000000000000" pitchFamily="2" charset="2"/>
+              <a:buChar char="Ø"/>
+            </a:pPr>
+            <a:r>
+              <a:rPr lang="en-US" sz="2800" dirty="0" smtClean="0"/>
+              <a:t>View Challenge</a:t>
+            </a:r>
+          </a:p>
+          <a:p>
+            <a:pPr marL="914400" lvl="1" indent="-457200">
+              <a:buClr>
+                <a:srgbClr val="0070C0"/>
+              </a:buClr>
+              <a:buFont typeface="Wingdings" panose="05000000000000000000" pitchFamily="2" charset="2"/>
+              <a:buChar char="Ø"/>
+            </a:pPr>
+            <a:endParaRPr lang="en-US" sz="2800" dirty="0" smtClean="0"/>
+          </a:p>
+          <a:p>
+            <a:pPr marL="914400" lvl="1" indent="-457200">
+              <a:buClr>
+                <a:schemeClr val="accent1">
+                  <a:lumMod val="75000"/>
+                </a:schemeClr>
+              </a:buClr>
+              <a:buFont typeface="Wingdings" panose="05000000000000000000" pitchFamily="2" charset="2"/>
+              <a:buChar char="Ø"/>
+            </a:pPr>
+            <a:endParaRPr lang="en-US" sz="2800" dirty="0" smtClean="0"/>
+          </a:p>
+          <a:p>
+            <a:pPr marL="457200" indent="-457200">
+              <a:buFont typeface="Wingdings" panose="05000000000000000000" pitchFamily="2" charset="2"/>
+              <a:buChar char="Ø"/>
+            </a:pPr>
+            <a:endParaRPr lang="en-US" sz="2800" dirty="0" smtClean="0"/>
+          </a:p>
+          <a:p>
+            <a:pPr marL="914400" lvl="1" indent="-457200">
+              <a:buFont typeface="Wingdings" panose="05000000000000000000" pitchFamily="2" charset="2"/>
+              <a:buChar char="Ø"/>
+            </a:pPr>
+            <a:endParaRPr lang="en-US" sz="2800" dirty="0" smtClean="0"/>
+          </a:p>
+        </p:txBody>
+      </p:sp>
+      <p:pic>
+        <p:nvPicPr>
+          <p:cNvPr id="9" name="Picture 8"/>
+          <p:cNvPicPr>
+            <a:picLocks noChangeAspect="1"/>
+          </p:cNvPicPr>
+          <p:nvPr/>
+        </p:nvPicPr>
+        <p:blipFill>
+          <a:blip r:embed="rId2">
+            <a:extLst>
+              <a:ext uri="{28A0092B-C50C-407E-A947-70E740481C1C}">
+                <a14:useLocalDpi xmlns:a14="http://schemas.microsoft.com/office/drawing/2010/main" val="0"/>
+              </a:ext>
+            </a:extLst>
+          </a:blip>
+          <a:stretch>
+            <a:fillRect/>
+          </a:stretch>
+        </p:blipFill>
+        <p:spPr>
+          <a:xfrm>
+            <a:off x="195355" y="1023586"/>
+            <a:ext cx="3054647" cy="2499257"/>
+          </a:xfrm>
+          <a:prstGeom prst="rect">
+            <a:avLst/>
+          </a:prstGeom>
+        </p:spPr>
+      </p:pic>
+    </p:spTree>
+    <p:extLst>
+      <p:ext uri="{BB962C8B-B14F-4D97-AF65-F5344CB8AC3E}">
+        <p14:creationId xmlns:p14="http://schemas.microsoft.com/office/powerpoint/2010/main" val="2431153840"/>
+      </p:ext>
+    </p:extLst>
+  </p:cSld>
+  <p:clrMapOvr>
+    <a:masterClrMapping/>
+  </p:clrMapOvr>
+  <p:timing>
+    <p:tnLst>
+      <p:par>
+        <p:cTn id="1" dur="indefinite" restart="never" nodeType="tmRoot"/>
+      </p:par>
+    </p:tnLst>
+  </p:timing>
+</p:sld>
+</file>
+
+<file path=ppt/slides/slide5.xml><?xml version="1.0" encoding="utf-8"?>
+<p:sld xmlns:a="http://schemas.openxmlformats.org/drawingml/2006/main" xmlns:r="http://schemas.openxmlformats.org/officeDocument/2006/relationships" xmlns:p="http://schemas.openxmlformats.org/presentationml/2006/main">
+  <p:cSld>
+    <p:spTree>
+      <p:nvGrpSpPr>
+        <p:cNvPr id="1" name=""/>
+        <p:cNvGrpSpPr/>
+        <p:nvPr/>
+      </p:nvGrpSpPr>
+      <p:grpSpPr>
+        <a:xfrm>
+          <a:off x="0" y="0"/>
+          <a:ext cx="0" cy="0"/>
+          <a:chOff x="0" y="0"/>
+          <a:chExt cx="0" cy="0"/>
+        </a:xfrm>
+      </p:grpSpPr>
+      <p:sp>
+        <p:nvSpPr>
+          <p:cNvPr id="10" name="TextBox 9"/>
+          <p:cNvSpPr txBox="1"/>
+          <p:nvPr/>
+        </p:nvSpPr>
+        <p:spPr>
+          <a:xfrm>
+            <a:off x="3640348" y="724619"/>
+            <a:ext cx="5589917" cy="523220"/>
+          </a:xfrm>
+          <a:prstGeom prst="rect">
+            <a:avLst/>
+          </a:prstGeom>
+          <a:noFill/>
+        </p:spPr>
+        <p:txBody>
+          <a:bodyPr wrap="square" rtlCol="0">
+            <a:spAutoFit/>
+          </a:bodyPr>
+          <a:lstStyle/>
+          <a:p>
+            <a:r>
+              <a:rPr lang="en-US" sz="2800" b="1" dirty="0" smtClean="0"/>
+              <a:t>Current Bugs</a:t>
+            </a:r>
+            <a:endParaRPr lang="en-US" sz="2800" b="1" dirty="0"/>
+          </a:p>
+        </p:txBody>
+      </p:sp>
+      <p:sp>
+        <p:nvSpPr>
+          <p:cNvPr id="11" name="TextBox 10"/>
+          <p:cNvSpPr txBox="1"/>
+          <p:nvPr/>
+        </p:nvSpPr>
+        <p:spPr>
+          <a:xfrm>
+            <a:off x="3459116" y="1365273"/>
+            <a:ext cx="8212184" cy="2677656"/>
+          </a:xfrm>
+          <a:prstGeom prst="rect">
+            <a:avLst/>
+          </a:prstGeom>
+          <a:noFill/>
+        </p:spPr>
+        <p:txBody>
+          <a:bodyPr wrap="square" rtlCol="0">
+            <a:spAutoFit/>
+          </a:bodyPr>
+          <a:lstStyle/>
+          <a:p>
+            <a:pPr marL="914400" lvl="1" indent="-457200">
+              <a:buClr>
+                <a:srgbClr val="0070C0"/>
+              </a:buClr>
+              <a:buFont typeface="Wingdings" panose="05000000000000000000" pitchFamily="2" charset="2"/>
+              <a:buChar char="Ø"/>
+            </a:pPr>
+            <a:r>
+              <a:rPr lang="en-US" sz="2800" dirty="0" smtClean="0"/>
+              <a:t>Set Order: In </a:t>
+            </a:r>
+            <a:r>
+              <a:rPr lang="en-US" sz="2800" dirty="0" err="1" smtClean="0"/>
+              <a:t>view_exercises.php</a:t>
+            </a:r>
+            <a:r>
+              <a:rPr lang="en-US" sz="2800" dirty="0" smtClean="0"/>
+              <a:t> or Exercise Info, the set order sometimes shows </a:t>
+            </a:r>
+            <a:r>
+              <a:rPr lang="en-US" sz="2800" dirty="0" smtClean="0"/>
+              <a:t>in reverse order</a:t>
+            </a:r>
+            <a:endParaRPr lang="en-US" sz="2800" dirty="0" smtClean="0"/>
+          </a:p>
+          <a:p>
+            <a:pPr marL="914400" lvl="1" indent="-457200">
+              <a:buClr>
+                <a:srgbClr val="0070C0"/>
+              </a:buClr>
+              <a:buFont typeface="Wingdings" panose="05000000000000000000" pitchFamily="2" charset="2"/>
+              <a:buChar char="Ø"/>
+            </a:pPr>
+            <a:endParaRPr lang="en-US" sz="2800" dirty="0" smtClean="0"/>
+          </a:p>
+          <a:p>
+            <a:endParaRPr lang="en-US" sz="2800" dirty="0" smtClean="0"/>
+          </a:p>
+          <a:p>
+            <a:pPr marL="914400" lvl="1" indent="-457200">
+              <a:buFont typeface="Wingdings" panose="05000000000000000000" pitchFamily="2" charset="2"/>
+              <a:buChar char="Ø"/>
+            </a:pPr>
+            <a:endParaRPr lang="en-US" sz="2800" dirty="0" smtClean="0"/>
+          </a:p>
+        </p:txBody>
+      </p:sp>
+      <p:pic>
+        <p:nvPicPr>
+          <p:cNvPr id="9" name="Picture 8"/>
+          <p:cNvPicPr>
+            <a:picLocks noChangeAspect="1"/>
+          </p:cNvPicPr>
+          <p:nvPr/>
+        </p:nvPicPr>
+        <p:blipFill>
+          <a:blip r:embed="rId2">
+            <a:extLst>
+              <a:ext uri="{28A0092B-C50C-407E-A947-70E740481C1C}">
+                <a14:useLocalDpi xmlns:a14="http://schemas.microsoft.com/office/drawing/2010/main" val="0"/>
+              </a:ext>
+            </a:extLst>
+          </a:blip>
+          <a:stretch>
+            <a:fillRect/>
+          </a:stretch>
+        </p:blipFill>
+        <p:spPr>
+          <a:xfrm>
+            <a:off x="195355" y="1023586"/>
+            <a:ext cx="3054647" cy="2499257"/>
+          </a:xfrm>
+          <a:prstGeom prst="rect">
+            <a:avLst/>
+          </a:prstGeom>
+        </p:spPr>
+      </p:pic>
+      <p:pic>
+        <p:nvPicPr>
+          <p:cNvPr id="2" name="Picture 1"/>
+          <p:cNvPicPr>
+            <a:picLocks noChangeAspect="1"/>
+          </p:cNvPicPr>
+          <p:nvPr/>
+        </p:nvPicPr>
+        <p:blipFill>
+          <a:blip r:embed="rId3"/>
+          <a:stretch>
+            <a:fillRect/>
+          </a:stretch>
+        </p:blipFill>
+        <p:spPr>
+          <a:xfrm>
+            <a:off x="7721600" y="2361047"/>
+            <a:ext cx="3835400" cy="4392602"/>
+          </a:xfrm>
+          <a:prstGeom prst="rect">
+            <a:avLst/>
+          </a:prstGeom>
+        </p:spPr>
+      </p:pic>
+    </p:spTree>
+    <p:extLst>
+      <p:ext uri="{BB962C8B-B14F-4D97-AF65-F5344CB8AC3E}">
+        <p14:creationId xmlns:p14="http://schemas.microsoft.com/office/powerpoint/2010/main" val="1391420568"/>
+      </p:ext>
+    </p:extLst>
+  </p:cSld>
+  <p:clrMapOvr>
+    <a:masterClrMapping/>
+  </p:clrMapOvr>
+  <p:timing>
+    <p:tnLst>
+      <p:par>
+        <p:cTn id="1" dur="indefinite" restart="never" nodeType="tmRoot"/>
+      </p:par>
+    </p:tnLst>
+  </p:timing>
+</p:sld>
+</file>
+
+<file path=ppt/slides/slide6.xml><?xml version="1.0" encoding="utf-8"?>
+<p:sld xmlns:a="http://schemas.openxmlformats.org/drawingml/2006/main" xmlns:r="http://schemas.openxmlformats.org/officeDocument/2006/relationships" xmlns:p="http://schemas.openxmlformats.org/presentationml/2006/main">
+  <p:cSld>
+    <p:spTree>
+      <p:nvGrpSpPr>
+        <p:cNvPr id="1" name=""/>
+        <p:cNvGrpSpPr/>
+        <p:nvPr/>
+      </p:nvGrpSpPr>
+      <p:grpSpPr>
+        <a:xfrm>
+          <a:off x="0" y="0"/>
+          <a:ext cx="0" cy="0"/>
+          <a:chOff x="0" y="0"/>
+          <a:chExt cx="0" cy="0"/>
+        </a:xfrm>
+      </p:grpSpPr>
+      <p:sp>
+        <p:nvSpPr>
+          <p:cNvPr id="10" name="TextBox 9"/>
+          <p:cNvSpPr txBox="1"/>
+          <p:nvPr/>
+        </p:nvSpPr>
+        <p:spPr>
+          <a:xfrm>
+            <a:off x="3640348" y="724619"/>
+            <a:ext cx="5589917" cy="523220"/>
+          </a:xfrm>
+          <a:prstGeom prst="rect">
+            <a:avLst/>
+          </a:prstGeom>
+          <a:noFill/>
+        </p:spPr>
+        <p:txBody>
+          <a:bodyPr wrap="square" rtlCol="0">
+            <a:spAutoFit/>
+          </a:bodyPr>
+          <a:lstStyle/>
+          <a:p>
+            <a:r>
+              <a:rPr lang="en-US" sz="2800" b="1" dirty="0" smtClean="0"/>
+              <a:t>Current Bugs</a:t>
+            </a:r>
+            <a:endParaRPr lang="en-US" sz="2800" b="1" dirty="0"/>
+          </a:p>
+        </p:txBody>
+      </p:sp>
+      <p:sp>
+        <p:nvSpPr>
+          <p:cNvPr id="11" name="TextBox 10"/>
+          <p:cNvSpPr txBox="1"/>
+          <p:nvPr/>
+        </p:nvSpPr>
+        <p:spPr>
+          <a:xfrm>
+            <a:off x="3459116" y="1365273"/>
+            <a:ext cx="8212184" cy="3108543"/>
+          </a:xfrm>
+          <a:prstGeom prst="rect">
+            <a:avLst/>
+          </a:prstGeom>
+          <a:noFill/>
+        </p:spPr>
+        <p:txBody>
+          <a:bodyPr wrap="square" rtlCol="0">
+            <a:spAutoFit/>
+          </a:bodyPr>
+          <a:lstStyle/>
+          <a:p>
+            <a:pPr marL="914400" lvl="1" indent="-457200">
+              <a:buClr>
+                <a:srgbClr val="0070C0"/>
+              </a:buClr>
+              <a:buFont typeface="Wingdings" panose="05000000000000000000" pitchFamily="2" charset="2"/>
+              <a:buChar char="Ø"/>
+            </a:pPr>
+            <a:r>
+              <a:rPr lang="en-US" sz="2800" dirty="0" smtClean="0"/>
+              <a:t>Blank Input: </a:t>
+            </a:r>
+            <a:r>
+              <a:rPr lang="en-US" sz="2800" dirty="0"/>
+              <a:t>Safari does not support input attribute "</a:t>
+            </a:r>
+            <a:r>
+              <a:rPr lang="en-US" sz="2800" dirty="0" smtClean="0"/>
+              <a:t>required” so </a:t>
+            </a:r>
+            <a:r>
+              <a:rPr lang="en-US" sz="2800" dirty="0"/>
+              <a:t>the form can be submitted without put in any </a:t>
+            </a:r>
+            <a:r>
+              <a:rPr lang="en-US" sz="2800" dirty="0" smtClean="0"/>
+              <a:t>input (Affected pages</a:t>
+            </a:r>
+            <a:r>
+              <a:rPr lang="en-US" sz="2800" dirty="0"/>
+              <a:t>: </a:t>
+            </a:r>
+            <a:r>
+              <a:rPr lang="en-US" sz="2800" dirty="0" err="1" smtClean="0"/>
+              <a:t>add_routine.php</a:t>
+            </a:r>
+            <a:r>
+              <a:rPr lang="en-US" sz="2800" dirty="0"/>
+              <a:t>, </a:t>
+            </a:r>
+            <a:r>
+              <a:rPr lang="en-US" sz="2800" dirty="0" err="1"/>
+              <a:t>edit_routine.php</a:t>
+            </a:r>
+            <a:r>
+              <a:rPr lang="en-US" sz="2800" dirty="0"/>
+              <a:t>, and </a:t>
+            </a:r>
+            <a:r>
+              <a:rPr lang="en-US" sz="2800" dirty="0" err="1" smtClean="0"/>
+              <a:t>addChallenges.php</a:t>
+            </a:r>
+            <a:r>
+              <a:rPr lang="en-US" sz="2800" dirty="0"/>
+              <a:t>)</a:t>
+            </a:r>
+            <a:endParaRPr lang="en-US" sz="2800" dirty="0" smtClean="0"/>
+          </a:p>
+          <a:p>
+            <a:endParaRPr lang="en-US" sz="2800" dirty="0" smtClean="0"/>
+          </a:p>
+          <a:p>
+            <a:pPr marL="914400" lvl="1" indent="-457200">
+              <a:buFont typeface="Wingdings" panose="05000000000000000000" pitchFamily="2" charset="2"/>
+              <a:buChar char="Ø"/>
+            </a:pPr>
+            <a:endParaRPr lang="en-US" sz="2800" dirty="0" smtClean="0"/>
+          </a:p>
+        </p:txBody>
+      </p:sp>
+      <p:pic>
+        <p:nvPicPr>
+          <p:cNvPr id="9" name="Picture 8"/>
+          <p:cNvPicPr>
+            <a:picLocks noChangeAspect="1"/>
+          </p:cNvPicPr>
+          <p:nvPr/>
+        </p:nvPicPr>
+        <p:blipFill>
+          <a:blip r:embed="rId2">
+            <a:extLst>
+              <a:ext uri="{28A0092B-C50C-407E-A947-70E740481C1C}">
+                <a14:useLocalDpi xmlns:a14="http://schemas.microsoft.com/office/drawing/2010/main" val="0"/>
+              </a:ext>
+            </a:extLst>
+          </a:blip>
+          <a:stretch>
+            <a:fillRect/>
+          </a:stretch>
+        </p:blipFill>
+        <p:spPr>
+          <a:xfrm>
+            <a:off x="195355" y="1023586"/>
+            <a:ext cx="3054647" cy="2499257"/>
+          </a:xfrm>
+          <a:prstGeom prst="rect">
+            <a:avLst/>
+          </a:prstGeom>
+        </p:spPr>
+      </p:pic>
+    </p:spTree>
+    <p:extLst>
+      <p:ext uri="{BB962C8B-B14F-4D97-AF65-F5344CB8AC3E}">
+        <p14:creationId xmlns:p14="http://schemas.microsoft.com/office/powerpoint/2010/main" val="119715449"/>
+      </p:ext>
+    </p:extLst>
+  </p:cSld>
+  <p:clrMapOvr>
+    <a:masterClrMapping/>
+  </p:clrMapOvr>
+  <p:timing>
+    <p:tnLst>
+      <p:par>
+        <p:cTn id="1" dur="indefinite" restart="never" nodeType="tmRoot"/>
+      </p:par>
+    </p:tnLst>
+  </p:timing>
+</p:sld>
+</file>
+
+<file path=ppt/slides/slide7.xml><?xml version="1.0" encoding="utf-8"?>
+<p:sld xmlns:a="http://schemas.openxmlformats.org/drawingml/2006/main" xmlns:r="http://schemas.openxmlformats.org/officeDocument/2006/relationships" xmlns:p="http://schemas.openxmlformats.org/presentationml/2006/main">
+  <p:cSld>
+    <p:spTree>
+      <p:nvGrpSpPr>
+        <p:cNvPr id="1" name=""/>
+        <p:cNvGrpSpPr/>
+        <p:nvPr/>
+      </p:nvGrpSpPr>
+      <p:grpSpPr>
+        <a:xfrm>
+          <a:off x="0" y="0"/>
+          <a:ext cx="0" cy="0"/>
+          <a:chOff x="0" y="0"/>
+          <a:chExt cx="0" cy="0"/>
+        </a:xfrm>
+      </p:grpSpPr>
+      <p:sp>
+        <p:nvSpPr>
+          <p:cNvPr id="10" name="TextBox 9"/>
+          <p:cNvSpPr txBox="1"/>
+          <p:nvPr/>
+        </p:nvSpPr>
+        <p:spPr>
+          <a:xfrm>
+            <a:off x="3640348" y="724619"/>
+            <a:ext cx="5589917" cy="523220"/>
+          </a:xfrm>
+          <a:prstGeom prst="rect">
+            <a:avLst/>
+          </a:prstGeom>
+          <a:noFill/>
+        </p:spPr>
+        <p:txBody>
+          <a:bodyPr wrap="square" rtlCol="0">
+            <a:spAutoFit/>
+          </a:bodyPr>
+          <a:lstStyle/>
+          <a:p>
+            <a:r>
+              <a:rPr lang="en-US" sz="2800" b="1" dirty="0" smtClean="0"/>
+              <a:t>Current Bugs</a:t>
+            </a:r>
+            <a:endParaRPr lang="en-US" sz="2800" b="1" dirty="0"/>
+          </a:p>
+        </p:txBody>
+      </p:sp>
+      <p:sp>
+        <p:nvSpPr>
+          <p:cNvPr id="11" name="TextBox 10"/>
+          <p:cNvSpPr txBox="1"/>
+          <p:nvPr/>
+        </p:nvSpPr>
+        <p:spPr>
+          <a:xfrm>
+            <a:off x="3459116" y="1365273"/>
+            <a:ext cx="8212184" cy="1815882"/>
+          </a:xfrm>
+          <a:prstGeom prst="rect">
+            <a:avLst/>
+          </a:prstGeom>
+          <a:noFill/>
+        </p:spPr>
+        <p:txBody>
+          <a:bodyPr wrap="square" rtlCol="0">
+            <a:spAutoFit/>
+          </a:bodyPr>
+          <a:lstStyle/>
+          <a:p>
+            <a:pPr marL="914400" lvl="1" indent="-457200">
+              <a:buClr>
+                <a:srgbClr val="0070C0"/>
+              </a:buClr>
+              <a:buFont typeface="Wingdings" panose="05000000000000000000" pitchFamily="2" charset="2"/>
+              <a:buChar char="Ø"/>
+            </a:pPr>
+            <a:r>
+              <a:rPr lang="en-US" sz="2800" dirty="0" smtClean="0"/>
+              <a:t>Date Picker: </a:t>
+            </a:r>
+            <a:r>
+              <a:rPr lang="en-US" sz="2800" dirty="0"/>
+              <a:t>In </a:t>
+            </a:r>
+            <a:r>
+              <a:rPr lang="en-US" sz="2800" dirty="0" err="1"/>
+              <a:t>edit_routine.php</a:t>
+            </a:r>
+            <a:r>
+              <a:rPr lang="en-US" sz="2800" dirty="0"/>
+              <a:t>, user can change to a date that has already passed or select a end date before start date</a:t>
+            </a:r>
+            <a:endParaRPr lang="en-US" sz="2800" dirty="0" smtClean="0"/>
+          </a:p>
+          <a:p>
+            <a:pPr marL="914400" lvl="1" indent="-457200">
+              <a:buFont typeface="Wingdings" panose="05000000000000000000" pitchFamily="2" charset="2"/>
+              <a:buChar char="Ø"/>
+            </a:pPr>
+            <a:endParaRPr lang="en-US" sz="2800" dirty="0" smtClean="0"/>
+          </a:p>
+        </p:txBody>
+      </p:sp>
+      <p:pic>
+        <p:nvPicPr>
+          <p:cNvPr id="9" name="Picture 8"/>
+          <p:cNvPicPr>
+            <a:picLocks noChangeAspect="1"/>
+          </p:cNvPicPr>
+          <p:nvPr/>
+        </p:nvPicPr>
+        <p:blipFill>
+          <a:blip r:embed="rId2">
+            <a:extLst>
+              <a:ext uri="{28A0092B-C50C-407E-A947-70E740481C1C}">
+                <a14:useLocalDpi xmlns:a14="http://schemas.microsoft.com/office/drawing/2010/main" val="0"/>
+              </a:ext>
+            </a:extLst>
+          </a:blip>
+          <a:stretch>
+            <a:fillRect/>
+          </a:stretch>
+        </p:blipFill>
+        <p:spPr>
+          <a:xfrm>
+            <a:off x="195355" y="1023586"/>
+            <a:ext cx="3054647" cy="2499257"/>
+          </a:xfrm>
+          <a:prstGeom prst="rect">
+            <a:avLst/>
+          </a:prstGeom>
+        </p:spPr>
+      </p:pic>
+    </p:spTree>
+    <p:extLst>
+      <p:ext uri="{BB962C8B-B14F-4D97-AF65-F5344CB8AC3E}">
+        <p14:creationId xmlns:p14="http://schemas.microsoft.com/office/powerpoint/2010/main" val="1470140807"/>
+      </p:ext>
+    </p:extLst>
+  </p:cSld>
+  <p:clrMapOvr>
+    <a:masterClrMapping/>
+  </p:clrMapOvr>
+  <p:timing>
+    <p:tnLst>
+      <p:par>
+        <p:cTn id="1" dur="indefinite" restart="never" nodeType="tmRoot"/>
+      </p:par>
+    </p:tnLst>
+  </p:timing>
+</p:sld>
+</file>
+
+<file path=ppt/slides/slide8.xml><?xml version="1.0" encoding="utf-8"?>
+<p:sld xmlns:a="http://schemas.openxmlformats.org/drawingml/2006/main" xmlns:r="http://schemas.openxmlformats.org/officeDocument/2006/relationships" xmlns:p="http://schemas.openxmlformats.org/presentationml/2006/main">
+  <p:cSld>
+    <p:spTree>
+      <p:nvGrpSpPr>
+        <p:cNvPr id="1" name=""/>
+        <p:cNvGrpSpPr/>
+        <p:nvPr/>
+      </p:nvGrpSpPr>
+      <p:grpSpPr>
+        <a:xfrm>
+          <a:off x="0" y="0"/>
+          <a:ext cx="0" cy="0"/>
+          <a:chOff x="0" y="0"/>
+          <a:chExt cx="0" cy="0"/>
+        </a:xfrm>
+      </p:grpSpPr>
+      <p:sp>
+        <p:nvSpPr>
+          <p:cNvPr id="10" name="TextBox 9"/>
+          <p:cNvSpPr txBox="1"/>
+          <p:nvPr/>
+        </p:nvSpPr>
+        <p:spPr>
+          <a:xfrm>
+            <a:off x="3640348" y="724619"/>
+            <a:ext cx="5589917" cy="523220"/>
+          </a:xfrm>
+          <a:prstGeom prst="rect">
+            <a:avLst/>
+          </a:prstGeom>
+          <a:noFill/>
+        </p:spPr>
+        <p:txBody>
+          <a:bodyPr wrap="square" rtlCol="0">
+            <a:spAutoFit/>
+          </a:bodyPr>
+          <a:lstStyle/>
+          <a:p>
+            <a:r>
+              <a:rPr lang="en-US" sz="2800" b="1" dirty="0" smtClean="0"/>
+              <a:t>Current Bugs</a:t>
+            </a:r>
+            <a:endParaRPr lang="en-US" sz="2800" b="1" dirty="0"/>
+          </a:p>
+        </p:txBody>
+      </p:sp>
+      <p:sp>
+        <p:nvSpPr>
+          <p:cNvPr id="11" name="TextBox 10"/>
+          <p:cNvSpPr txBox="1"/>
+          <p:nvPr/>
+        </p:nvSpPr>
+        <p:spPr>
+          <a:xfrm>
+            <a:off x="3459116" y="1365273"/>
+            <a:ext cx="8212184" cy="1384995"/>
+          </a:xfrm>
+          <a:prstGeom prst="rect">
+            <a:avLst/>
+          </a:prstGeom>
+          <a:noFill/>
+        </p:spPr>
+        <p:txBody>
+          <a:bodyPr wrap="square" rtlCol="0">
+            <a:spAutoFit/>
+          </a:bodyPr>
+          <a:lstStyle/>
+          <a:p>
+            <a:pPr marL="914400" lvl="1" indent="-457200">
+              <a:buClr>
+                <a:srgbClr val="0070C0"/>
+              </a:buClr>
+              <a:buFont typeface="Wingdings" panose="05000000000000000000" pitchFamily="2" charset="2"/>
+              <a:buChar char="Ø"/>
+            </a:pPr>
+            <a:r>
+              <a:rPr lang="en-US" sz="2800" dirty="0" smtClean="0"/>
+              <a:t>Log entry: </a:t>
+            </a:r>
+            <a:r>
+              <a:rPr lang="en-US" sz="2800" dirty="0"/>
+              <a:t>In </a:t>
+            </a:r>
+            <a:r>
+              <a:rPr lang="en-US" sz="2800" dirty="0" err="1"/>
+              <a:t>view_exercise_log.php</a:t>
+            </a:r>
+            <a:r>
+              <a:rPr lang="en-US" sz="2800" dirty="0"/>
+              <a:t>, the actual reps and weight </a:t>
+            </a:r>
+            <a:r>
+              <a:rPr lang="en-US" sz="2800" dirty="0" smtClean="0"/>
+              <a:t>sometimes display </a:t>
+            </a:r>
+            <a:r>
+              <a:rPr lang="en-US" sz="2800" dirty="0"/>
+              <a:t>in reverse order</a:t>
+            </a:r>
+            <a:endParaRPr lang="en-US" sz="2800" dirty="0" smtClean="0"/>
+          </a:p>
+        </p:txBody>
+      </p:sp>
+      <p:pic>
+        <p:nvPicPr>
+          <p:cNvPr id="9" name="Picture 8"/>
+          <p:cNvPicPr>
+            <a:picLocks noChangeAspect="1"/>
+          </p:cNvPicPr>
+          <p:nvPr/>
+        </p:nvPicPr>
+        <p:blipFill>
+          <a:blip r:embed="rId2">
+            <a:extLst>
+              <a:ext uri="{28A0092B-C50C-407E-A947-70E740481C1C}">
+                <a14:useLocalDpi xmlns:a14="http://schemas.microsoft.com/office/drawing/2010/main" val="0"/>
+              </a:ext>
+            </a:extLst>
+          </a:blip>
+          <a:stretch>
+            <a:fillRect/>
+          </a:stretch>
+        </p:blipFill>
+        <p:spPr>
+          <a:xfrm>
+            <a:off x="195355" y="1023586"/>
+            <a:ext cx="3054647" cy="2499257"/>
+          </a:xfrm>
+          <a:prstGeom prst="rect">
+            <a:avLst/>
+          </a:prstGeom>
+        </p:spPr>
+      </p:pic>
+    </p:spTree>
+    <p:extLst>
+      <p:ext uri="{BB962C8B-B14F-4D97-AF65-F5344CB8AC3E}">
+        <p14:creationId xmlns:p14="http://schemas.microsoft.com/office/powerpoint/2010/main" val="268156130"/>
+      </p:ext>
+    </p:extLst>
+  </p:cSld>
+  <p:clrMapOvr>
+    <a:masterClrMapping/>
+  </p:clrMapOvr>
+  <p:timing>
+    <p:tnLst>
+      <p:par>
+        <p:cTn id="1" dur="indefinite" restart="never" nodeType="tmRoot"/>
+      </p:par>
+    </p:tnLst>
+  </p:timing>
+</p:sld>
+</file>
+
+<file path=ppt/slides/slide9.xml><?xml version="1.0" encoding="utf-8"?>
+<p:sld xmlns:a="http://schemas.openxmlformats.org/drawingml/2006/main" xmlns:r="http://schemas.openxmlformats.org/officeDocument/2006/relationships" xmlns:p="http://schemas.openxmlformats.org/presentationml/2006/main">
+  <p:cSld>
+    <p:spTree>
+      <p:nvGrpSpPr>
+        <p:cNvPr id="1" name=""/>
+        <p:cNvGrpSpPr/>
+        <p:nvPr/>
+      </p:nvGrpSpPr>
+      <p:grpSpPr>
+        <a:xfrm>
+          <a:off x="0" y="0"/>
+          <a:ext cx="0" cy="0"/>
+          <a:chOff x="0" y="0"/>
+          <a:chExt cx="0" cy="0"/>
+        </a:xfrm>
+      </p:grpSpPr>
+      <p:sp>
+        <p:nvSpPr>
+          <p:cNvPr id="10" name="TextBox 9"/>
+          <p:cNvSpPr txBox="1"/>
+          <p:nvPr/>
+        </p:nvSpPr>
+        <p:spPr>
+          <a:xfrm>
+            <a:off x="3640348" y="724619"/>
+            <a:ext cx="5589917" cy="523220"/>
+          </a:xfrm>
+          <a:prstGeom prst="rect">
+            <a:avLst/>
+          </a:prstGeom>
+          <a:noFill/>
+        </p:spPr>
+        <p:txBody>
+          <a:bodyPr wrap="square" rtlCol="0">
+            <a:spAutoFit/>
+          </a:bodyPr>
+          <a:lstStyle/>
+          <a:p>
+            <a:r>
+              <a:rPr lang="en-US" sz="2800" b="1" dirty="0"/>
+              <a:t>Deployment Plan</a:t>
+            </a:r>
+          </a:p>
+        </p:txBody>
+      </p:sp>
+      <p:pic>
+        <p:nvPicPr>
+          <p:cNvPr id="9" name="Picture 8"/>
+          <p:cNvPicPr>
+            <a:picLocks noChangeAspect="1"/>
+          </p:cNvPicPr>
+          <p:nvPr/>
+        </p:nvPicPr>
+        <p:blipFill>
+          <a:blip r:embed="rId2">
+            <a:extLst>
+              <a:ext uri="{28A0092B-C50C-407E-A947-70E740481C1C}">
+                <a14:useLocalDpi xmlns:a14="http://schemas.microsoft.com/office/drawing/2010/main" val="0"/>
+              </a:ext>
+            </a:extLst>
+          </a:blip>
+          <a:stretch>
+            <a:fillRect/>
+          </a:stretch>
+        </p:blipFill>
+        <p:spPr>
+          <a:xfrm>
+            <a:off x="195355" y="1023586"/>
+            <a:ext cx="3054647" cy="2499257"/>
+          </a:xfrm>
+          <a:prstGeom prst="rect">
+            <a:avLst/>
+          </a:prstGeom>
+        </p:spPr>
+      </p:pic>
+      <p:graphicFrame>
+        <p:nvGraphicFramePr>
+          <p:cNvPr id="2" name="Table 1"/>
+          <p:cNvGraphicFramePr>
+            <a:graphicFrameLocks noGrp="1"/>
+          </p:cNvGraphicFramePr>
+          <p:nvPr>
+            <p:extLst>
+              <p:ext uri="{D42A27DB-BD31-4B8C-83A1-F6EECF244321}">
+                <p14:modId xmlns:p14="http://schemas.microsoft.com/office/powerpoint/2010/main" val="2174365923"/>
+              </p:ext>
+            </p:extLst>
+          </p:nvPr>
+        </p:nvGraphicFramePr>
+        <p:xfrm>
+          <a:off x="3804156" y="1669547"/>
+          <a:ext cx="7194044" cy="4540752"/>
+        </p:xfrm>
+        <a:graphic>
+          <a:graphicData uri="http://schemas.openxmlformats.org/drawingml/2006/table">
+            <a:tbl>
+              <a:tblPr firstRow="1" firstCol="1" bandRow="1">
+                <a:tableStyleId>{5C22544A-7EE6-4342-B048-85BDC9FD1C3A}</a:tableStyleId>
+              </a:tblPr>
+              <a:tblGrid>
+                <a:gridCol w="2693860"/>
+                <a:gridCol w="4500184"/>
+              </a:tblGrid>
+              <a:tr h="756792">
+                <a:tc>
+                  <a:txBody>
+                    <a:bodyPr/>
+                    <a:lstStyle/>
+                    <a:p>
+                      <a:pPr marL="0" marR="0">
+                        <a:lnSpc>
+                          <a:spcPct val="115000"/>
+                        </a:lnSpc>
+                        <a:spcBef>
+                          <a:spcPts val="0"/>
+                        </a:spcBef>
+                        <a:spcAft>
+                          <a:spcPts val="0"/>
+                        </a:spcAft>
+                      </a:pPr>
+                      <a:r>
+                        <a:rPr lang="en-US" sz="2400" dirty="0">
+                          <a:effectLst/>
+                        </a:rPr>
+                        <a:t>Deployment </a:t>
+                      </a:r>
+                      <a:endParaRPr lang="en-US" sz="2400" dirty="0">
+                        <a:effectLst/>
+                        <a:latin typeface="Calibri" panose="020F0502020204030204" pitchFamily="34" charset="0"/>
+                        <a:ea typeface="Calibri" panose="020F0502020204030204" pitchFamily="34" charset="0"/>
+                        <a:cs typeface="Times New Roman" panose="02020603050405020304" pitchFamily="18" charset="0"/>
+                      </a:endParaRPr>
+                    </a:p>
+                  </a:txBody>
+                  <a:tcPr marL="68580" marR="68580" marT="0" marB="0"/>
+                </a:tc>
+                <a:tc>
+                  <a:txBody>
+                    <a:bodyPr/>
+                    <a:lstStyle/>
+                    <a:p>
+                      <a:pPr marL="0" marR="0">
+                        <a:lnSpc>
+                          <a:spcPct val="115000"/>
+                        </a:lnSpc>
+                        <a:spcBef>
+                          <a:spcPts val="0"/>
+                        </a:spcBef>
+                        <a:spcAft>
+                          <a:spcPts val="0"/>
+                        </a:spcAft>
+                      </a:pPr>
+                      <a:r>
+                        <a:rPr lang="en-US" sz="2400">
+                          <a:effectLst/>
+                        </a:rPr>
+                        <a:t>Cost</a:t>
+                      </a:r>
+                      <a:endParaRPr lang="en-US" sz="2400">
+                        <a:effectLst/>
+                        <a:latin typeface="Calibri" panose="020F0502020204030204" pitchFamily="34" charset="0"/>
+                        <a:ea typeface="Calibri" panose="020F0502020204030204" pitchFamily="34" charset="0"/>
+                        <a:cs typeface="Times New Roman" panose="02020603050405020304" pitchFamily="18" charset="0"/>
+                      </a:endParaRPr>
+                    </a:p>
+                  </a:txBody>
+                  <a:tcPr marL="68580" marR="68580" marT="0" marB="0"/>
+                </a:tc>
+              </a:tr>
+              <a:tr h="756792">
+                <a:tc>
+                  <a:txBody>
+                    <a:bodyPr/>
+                    <a:lstStyle/>
+                    <a:p>
+                      <a:pPr marL="0" marR="0">
+                        <a:lnSpc>
+                          <a:spcPct val="115000"/>
+                        </a:lnSpc>
+                        <a:spcBef>
+                          <a:spcPts val="0"/>
+                        </a:spcBef>
+                        <a:spcAft>
+                          <a:spcPts val="0"/>
+                        </a:spcAft>
+                      </a:pPr>
+                      <a:r>
+                        <a:rPr lang="en-US" sz="2400" dirty="0">
+                          <a:effectLst/>
+                        </a:rPr>
+                        <a:t>T-shirts</a:t>
+                      </a:r>
+                      <a:endParaRPr lang="en-US" sz="2400" dirty="0">
+                        <a:effectLst/>
+                        <a:latin typeface="Calibri" panose="020F0502020204030204" pitchFamily="34" charset="0"/>
+                        <a:ea typeface="Calibri" panose="020F0502020204030204" pitchFamily="34" charset="0"/>
+                        <a:cs typeface="Times New Roman" panose="02020603050405020304" pitchFamily="18" charset="0"/>
+                      </a:endParaRPr>
+                    </a:p>
+                  </a:txBody>
+                  <a:tcPr marL="68580" marR="68580" marT="0" marB="0"/>
+                </a:tc>
+                <a:tc>
+                  <a:txBody>
+                    <a:bodyPr/>
+                    <a:lstStyle/>
+                    <a:p>
+                      <a:pPr marL="0" marR="0">
+                        <a:lnSpc>
+                          <a:spcPct val="115000"/>
+                        </a:lnSpc>
+                        <a:spcBef>
+                          <a:spcPts val="0"/>
+                        </a:spcBef>
+                        <a:spcAft>
+                          <a:spcPts val="0"/>
+                        </a:spcAft>
+                      </a:pPr>
+                      <a:r>
+                        <a:rPr lang="en-US" sz="2400">
+                          <a:effectLst/>
+                        </a:rPr>
+                        <a:t>$442.20</a:t>
+                      </a:r>
+                      <a:endParaRPr lang="en-US" sz="2400">
+                        <a:effectLst/>
+                        <a:latin typeface="Calibri" panose="020F0502020204030204" pitchFamily="34" charset="0"/>
+                        <a:ea typeface="Calibri" panose="020F0502020204030204" pitchFamily="34" charset="0"/>
+                        <a:cs typeface="Times New Roman" panose="02020603050405020304" pitchFamily="18" charset="0"/>
+                      </a:endParaRPr>
+                    </a:p>
+                  </a:txBody>
+                  <a:tcPr marL="68580" marR="68580" marT="0" marB="0"/>
+                </a:tc>
+              </a:tr>
+              <a:tr h="756792">
+                <a:tc>
+                  <a:txBody>
+                    <a:bodyPr/>
+                    <a:lstStyle/>
+                    <a:p>
+                      <a:pPr marL="0" marR="0">
+                        <a:lnSpc>
+                          <a:spcPct val="115000"/>
+                        </a:lnSpc>
+                        <a:spcBef>
+                          <a:spcPts val="0"/>
+                        </a:spcBef>
+                        <a:spcAft>
+                          <a:spcPts val="0"/>
+                        </a:spcAft>
+                      </a:pPr>
+                      <a:r>
+                        <a:rPr lang="en-US" sz="2400" dirty="0">
+                          <a:effectLst/>
+                        </a:rPr>
+                        <a:t>Convention</a:t>
+                      </a:r>
+                      <a:endParaRPr lang="en-US" sz="2400" dirty="0">
+                        <a:effectLst/>
+                        <a:latin typeface="Calibri" panose="020F0502020204030204" pitchFamily="34" charset="0"/>
+                        <a:ea typeface="Calibri" panose="020F0502020204030204" pitchFamily="34" charset="0"/>
+                        <a:cs typeface="Times New Roman" panose="02020603050405020304" pitchFamily="18" charset="0"/>
+                      </a:endParaRPr>
+                    </a:p>
+                  </a:txBody>
+                  <a:tcPr marL="68580" marR="68580" marT="0" marB="0"/>
+                </a:tc>
+                <a:tc>
+                  <a:txBody>
+                    <a:bodyPr/>
+                    <a:lstStyle/>
+                    <a:p>
+                      <a:pPr marL="0" marR="0">
+                        <a:lnSpc>
+                          <a:spcPct val="115000"/>
+                        </a:lnSpc>
+                        <a:spcBef>
+                          <a:spcPts val="0"/>
+                        </a:spcBef>
+                        <a:spcAft>
+                          <a:spcPts val="0"/>
+                        </a:spcAft>
+                      </a:pPr>
+                      <a:r>
+                        <a:rPr lang="en-US" sz="2400" dirty="0">
+                          <a:effectLst/>
+                        </a:rPr>
+                        <a:t>$6,600</a:t>
+                      </a:r>
+                      <a:endParaRPr lang="en-US" sz="2400" dirty="0">
+                        <a:effectLst/>
+                        <a:latin typeface="Calibri" panose="020F0502020204030204" pitchFamily="34" charset="0"/>
+                        <a:ea typeface="Calibri" panose="020F0502020204030204" pitchFamily="34" charset="0"/>
+                        <a:cs typeface="Times New Roman" panose="02020603050405020304" pitchFamily="18" charset="0"/>
+                      </a:endParaRPr>
+                    </a:p>
+                  </a:txBody>
+                  <a:tcPr marL="68580" marR="68580" marT="0" marB="0"/>
+                </a:tc>
+              </a:tr>
+              <a:tr h="756792">
+                <a:tc>
+                  <a:txBody>
+                    <a:bodyPr/>
+                    <a:lstStyle/>
+                    <a:p>
+                      <a:pPr marL="0" marR="0">
+                        <a:lnSpc>
+                          <a:spcPct val="115000"/>
+                        </a:lnSpc>
+                        <a:spcBef>
+                          <a:spcPts val="0"/>
+                        </a:spcBef>
+                        <a:spcAft>
+                          <a:spcPts val="0"/>
+                        </a:spcAft>
+                      </a:pPr>
+                      <a:r>
+                        <a:rPr lang="en-US" sz="2400">
+                          <a:effectLst/>
+                        </a:rPr>
+                        <a:t>Web Advertising</a:t>
+                      </a:r>
+                      <a:endParaRPr lang="en-US" sz="2400">
+                        <a:effectLst/>
+                        <a:latin typeface="Calibri" panose="020F0502020204030204" pitchFamily="34" charset="0"/>
+                        <a:ea typeface="Calibri" panose="020F0502020204030204" pitchFamily="34" charset="0"/>
+                        <a:cs typeface="Times New Roman" panose="02020603050405020304" pitchFamily="18" charset="0"/>
+                      </a:endParaRPr>
+                    </a:p>
+                  </a:txBody>
+                  <a:tcPr marL="68580" marR="68580" marT="0" marB="0"/>
+                </a:tc>
+                <a:tc>
+                  <a:txBody>
+                    <a:bodyPr/>
+                    <a:lstStyle/>
+                    <a:p>
+                      <a:pPr marL="0" marR="0">
+                        <a:lnSpc>
+                          <a:spcPct val="115000"/>
+                        </a:lnSpc>
+                        <a:spcBef>
+                          <a:spcPts val="0"/>
+                        </a:spcBef>
+                        <a:spcAft>
+                          <a:spcPts val="0"/>
+                        </a:spcAft>
+                      </a:pPr>
+                      <a:r>
+                        <a:rPr lang="en-US" sz="2400" dirty="0">
+                          <a:effectLst/>
+                        </a:rPr>
+                        <a:t>$100,000</a:t>
+                      </a:r>
+                      <a:endParaRPr lang="en-US" sz="2400" dirty="0">
+                        <a:effectLst/>
+                        <a:latin typeface="Calibri" panose="020F0502020204030204" pitchFamily="34" charset="0"/>
+                        <a:ea typeface="Calibri" panose="020F0502020204030204" pitchFamily="34" charset="0"/>
+                        <a:cs typeface="Times New Roman" panose="02020603050405020304" pitchFamily="18" charset="0"/>
+                      </a:endParaRPr>
+                    </a:p>
+                  </a:txBody>
+                  <a:tcPr marL="68580" marR="68580" marT="0" marB="0"/>
+                </a:tc>
+              </a:tr>
+              <a:tr h="756792">
+                <a:tc>
+                  <a:txBody>
+                    <a:bodyPr/>
+                    <a:lstStyle/>
+                    <a:p>
+                      <a:pPr marL="0" marR="0">
+                        <a:lnSpc>
+                          <a:spcPct val="115000"/>
+                        </a:lnSpc>
+                        <a:spcBef>
+                          <a:spcPts val="0"/>
+                        </a:spcBef>
+                        <a:spcAft>
+                          <a:spcPts val="0"/>
+                        </a:spcAft>
+                      </a:pPr>
+                      <a:r>
+                        <a:rPr lang="en-US" sz="2400">
+                          <a:effectLst/>
+                        </a:rPr>
+                        <a:t>Advertising Banner</a:t>
+                      </a:r>
+                      <a:endParaRPr lang="en-US" sz="2400">
+                        <a:effectLst/>
+                        <a:latin typeface="Calibri" panose="020F0502020204030204" pitchFamily="34" charset="0"/>
+                        <a:ea typeface="Calibri" panose="020F0502020204030204" pitchFamily="34" charset="0"/>
+                        <a:cs typeface="Times New Roman" panose="02020603050405020304" pitchFamily="18" charset="0"/>
+                      </a:endParaRPr>
+                    </a:p>
+                  </a:txBody>
+                  <a:tcPr marL="68580" marR="68580" marT="0" marB="0"/>
+                </a:tc>
+                <a:tc>
+                  <a:txBody>
+                    <a:bodyPr/>
+                    <a:lstStyle/>
+                    <a:p>
+                      <a:pPr marL="0" marR="0">
+                        <a:lnSpc>
+                          <a:spcPct val="115000"/>
+                        </a:lnSpc>
+                        <a:spcBef>
+                          <a:spcPts val="0"/>
+                        </a:spcBef>
+                        <a:spcAft>
+                          <a:spcPts val="0"/>
+                        </a:spcAft>
+                      </a:pPr>
+                      <a:r>
+                        <a:rPr lang="en-US" sz="2400" dirty="0">
+                          <a:effectLst/>
+                        </a:rPr>
+                        <a:t>$79.00</a:t>
+                      </a:r>
+                      <a:endParaRPr lang="en-US" sz="2400" dirty="0">
+                        <a:effectLst/>
+                        <a:latin typeface="Calibri" panose="020F0502020204030204" pitchFamily="34" charset="0"/>
+                        <a:ea typeface="Calibri" panose="020F0502020204030204" pitchFamily="34" charset="0"/>
+                        <a:cs typeface="Times New Roman" panose="02020603050405020304" pitchFamily="18" charset="0"/>
+                      </a:endParaRPr>
+                    </a:p>
+                  </a:txBody>
+                  <a:tcPr marL="68580" marR="68580" marT="0" marB="0"/>
+                </a:tc>
+              </a:tr>
+              <a:tr h="756792">
+                <a:tc>
+                  <a:txBody>
+                    <a:bodyPr/>
+                    <a:lstStyle/>
+                    <a:p>
+                      <a:pPr marL="0" marR="0">
+                        <a:lnSpc>
+                          <a:spcPct val="115000"/>
+                        </a:lnSpc>
+                        <a:spcBef>
+                          <a:spcPts val="0"/>
+                        </a:spcBef>
+                        <a:spcAft>
+                          <a:spcPts val="0"/>
+                        </a:spcAft>
+                      </a:pPr>
+                      <a:r>
+                        <a:rPr lang="en-US" sz="2400">
+                          <a:effectLst/>
+                        </a:rPr>
+                        <a:t>Totals </a:t>
+                      </a:r>
+                      <a:endParaRPr lang="en-US" sz="2400">
+                        <a:effectLst/>
+                        <a:latin typeface="Calibri" panose="020F0502020204030204" pitchFamily="34" charset="0"/>
+                        <a:ea typeface="Calibri" panose="020F0502020204030204" pitchFamily="34" charset="0"/>
+                        <a:cs typeface="Times New Roman" panose="02020603050405020304" pitchFamily="18" charset="0"/>
+                      </a:endParaRPr>
+                    </a:p>
+                  </a:txBody>
+                  <a:tcPr marL="68580" marR="68580" marT="0" marB="0"/>
+                </a:tc>
+                <a:tc>
+                  <a:txBody>
+                    <a:bodyPr/>
+                    <a:lstStyle/>
+                    <a:p>
+                      <a:pPr marL="0" marR="0">
+                        <a:lnSpc>
+                          <a:spcPct val="115000"/>
+                        </a:lnSpc>
+                        <a:spcBef>
+                          <a:spcPts val="0"/>
+                        </a:spcBef>
+                        <a:spcAft>
+                          <a:spcPts val="0"/>
+                        </a:spcAft>
+                      </a:pPr>
+                      <a:r>
+                        <a:rPr lang="en-US" sz="2400" dirty="0">
+                          <a:effectLst/>
+                        </a:rPr>
+                        <a:t>$107,121</a:t>
+                      </a:r>
+                      <a:endParaRPr lang="en-US" sz="2400" dirty="0">
+                        <a:effectLst/>
+                        <a:latin typeface="Calibri" panose="020F0502020204030204" pitchFamily="34" charset="0"/>
+                        <a:ea typeface="Calibri" panose="020F0502020204030204" pitchFamily="34" charset="0"/>
+                        <a:cs typeface="Times New Roman" panose="02020603050405020304" pitchFamily="18" charset="0"/>
+                      </a:endParaRPr>
+                    </a:p>
+                  </a:txBody>
+                  <a:tcPr marL="68580" marR="68580" marT="0" marB="0"/>
+                </a:tc>
+              </a:tr>
+            </a:tbl>
+          </a:graphicData>
+        </a:graphic>
+      </p:graphicFrame>
+    </p:spTree>
+    <p:extLst>
+      <p:ext uri="{BB962C8B-B14F-4D97-AF65-F5344CB8AC3E}">
+        <p14:creationId xmlns:p14="http://schemas.microsoft.com/office/powerpoint/2010/main" val="960174548"/>
+      </p:ext>
+    </p:extLst>
+  </p:cSld>
+  <p:clrMapOvr>
+    <a:masterClrMapping/>
+  </p:clrMapOvr>
+  <p:timing>
+    <p:tnLst>
+      <p:par>
+        <p:cTn id="1" dur="indefinite" restart="never" nodeType="tmRoot"/>
+      </p:par>
+    </p:tnLst>
+  </p:timing>
+</p:sld>
+</file>
+
 <file path=ppt/theme/theme1.xml><?xml version="1.0" encoding="utf-8"?>
 <a:theme xmlns:a="http://schemas.openxmlformats.org/drawingml/2006/main" name="Frame">
   <a:themeElements>

</xml_diff>